<commit_message>
EDA modified ppt and Graphs
</commit_message>
<xml_diff>
--- a/EDA/EDA_Presentation.pptx
+++ b/EDA/EDA_Presentation.pptx
@@ -5,10 +5,10 @@
     <p:sldMasterId id="2147484021" r:id="rId4"/>
   </p:sldMasterIdLst>
   <p:notesMasterIdLst>
-    <p:notesMasterId r:id="rId19"/>
+    <p:notesMasterId r:id="rId26"/>
   </p:notesMasterIdLst>
   <p:handoutMasterIdLst>
-    <p:handoutMasterId r:id="rId20"/>
+    <p:handoutMasterId r:id="rId27"/>
   </p:handoutMasterIdLst>
   <p:sldIdLst>
     <p:sldId id="256" r:id="rId5"/>
@@ -21,10 +21,17 @@
     <p:sldId id="262" r:id="rId12"/>
     <p:sldId id="263" r:id="rId13"/>
     <p:sldId id="264" r:id="rId14"/>
-    <p:sldId id="265" r:id="rId15"/>
-    <p:sldId id="266" r:id="rId16"/>
-    <p:sldId id="268" r:id="rId17"/>
-    <p:sldId id="267" r:id="rId18"/>
+    <p:sldId id="271" r:id="rId15"/>
+    <p:sldId id="272" r:id="rId16"/>
+    <p:sldId id="278" r:id="rId17"/>
+    <p:sldId id="275" r:id="rId18"/>
+    <p:sldId id="276" r:id="rId19"/>
+    <p:sldId id="273" r:id="rId20"/>
+    <p:sldId id="283" r:id="rId21"/>
+    <p:sldId id="280" r:id="rId22"/>
+    <p:sldId id="281" r:id="rId23"/>
+    <p:sldId id="266" r:id="rId24"/>
+    <p:sldId id="268" r:id="rId25"/>
   </p:sldIdLst>
   <p:sldSz cx="12192000" cy="6858000"/>
   <p:notesSz cx="6858000" cy="9144000"/>
@@ -161,7 +168,7 @@
           <p:cNvPr id="2" name="Header Placeholder 1">
             <a:extLst>
               <a:ext uri="{FF2B5EF4-FFF2-40B4-BE49-F238E27FC236}">
-                <a16:creationId xmlns:a16="http://schemas.microsoft.com/office/drawing/2014/main" xmlns="" id="{5BDC1D98-C769-46C6-A147-53C930501ED5}"/>
+                <a16:creationId xmlns="" xmlns:a16="http://schemas.microsoft.com/office/drawing/2014/main" id="{5BDC1D98-C769-46C6-A147-53C930501ED5}"/>
               </a:ext>
             </a:extLst>
           </p:cNvPr>
@@ -198,7 +205,7 @@
           <p:cNvPr id="3" name="Date Placeholder 2">
             <a:extLst>
               <a:ext uri="{FF2B5EF4-FFF2-40B4-BE49-F238E27FC236}">
-                <a16:creationId xmlns:a16="http://schemas.microsoft.com/office/drawing/2014/main" xmlns="" id="{06C11125-E352-4D19-934F-01F72303DD42}"/>
+                <a16:creationId xmlns="" xmlns:a16="http://schemas.microsoft.com/office/drawing/2014/main" id="{06C11125-E352-4D19-934F-01F72303DD42}"/>
               </a:ext>
             </a:extLst>
           </p:cNvPr>
@@ -228,7 +235,7 @@
           <a:p>
             <a:fld id="{04FDFA7D-FC3A-4F22-97FD-B6461C4354C9}" type="datetimeFigureOut">
               <a:rPr lang="en-US" smtClean="0"/>
-              <a:t>5/29/2022</a:t>
+              <a:t>6/6/2022</a:t>
             </a:fld>
             <a:endParaRPr lang="en-US" dirty="0"/>
           </a:p>
@@ -239,7 +246,7 @@
           <p:cNvPr id="4" name="Footer Placeholder 3">
             <a:extLst>
               <a:ext uri="{FF2B5EF4-FFF2-40B4-BE49-F238E27FC236}">
-                <a16:creationId xmlns:a16="http://schemas.microsoft.com/office/drawing/2014/main" xmlns="" id="{1B5EED7E-EA8E-42FA-83BF-FB44F84A6B7E}"/>
+                <a16:creationId xmlns="" xmlns:a16="http://schemas.microsoft.com/office/drawing/2014/main" id="{1B5EED7E-EA8E-42FA-83BF-FB44F84A6B7E}"/>
               </a:ext>
             </a:extLst>
           </p:cNvPr>
@@ -276,7 +283,7 @@
           <p:cNvPr id="5" name="Slide Number Placeholder 4">
             <a:extLst>
               <a:ext uri="{FF2B5EF4-FFF2-40B4-BE49-F238E27FC236}">
-                <a16:creationId xmlns:a16="http://schemas.microsoft.com/office/drawing/2014/main" xmlns="" id="{9168800B-E00E-4B71-9D80-7D2E0DF20F81}"/>
+                <a16:creationId xmlns="" xmlns:a16="http://schemas.microsoft.com/office/drawing/2014/main" id="{9168800B-E00E-4B71-9D80-7D2E0DF20F81}"/>
               </a:ext>
             </a:extLst>
           </p:cNvPr>
@@ -405,7 +412,7 @@
           <a:p>
             <a:fld id="{5CCE3A54-2F3C-414E-A2AD-AA799464C970}" type="datetimeFigureOut">
               <a:rPr lang="en-US" smtClean="0"/>
-              <a:t>5/29/2022</a:t>
+              <a:t>6/6/2022</a:t>
             </a:fld>
             <a:endParaRPr lang="en-US" dirty="0"/>
           </a:p>
@@ -860,7 +867,7 @@
           <a:p>
             <a:fld id="{4AAD347D-5ACD-4C99-B74B-A9C85AD731AF}" type="datetimeFigureOut">
               <a:rPr lang="en-US" smtClean="0"/>
-              <a:t>5/29/2022</a:t>
+              <a:t>6/6/2022</a:t>
             </a:fld>
             <a:endParaRPr lang="en-US" dirty="0"/>
           </a:p>
@@ -1198,7 +1205,7 @@
           <a:p>
             <a:fld id="{4AAD347D-5ACD-4C99-B74B-A9C85AD731AF}" type="datetimeFigureOut">
               <a:rPr lang="en-US" smtClean="0"/>
-              <a:t>5/29/2022</a:t>
+              <a:t>6/6/2022</a:t>
             </a:fld>
             <a:endParaRPr lang="en-US" dirty="0"/>
           </a:p>
@@ -1599,7 +1606,7 @@
           <a:p>
             <a:fld id="{4AAD347D-5ACD-4C99-B74B-A9C85AD731AF}" type="datetimeFigureOut">
               <a:rPr lang="en-US" smtClean="0"/>
-              <a:t>5/29/2022</a:t>
+              <a:t>6/6/2022</a:t>
             </a:fld>
             <a:endParaRPr lang="en-US" dirty="0"/>
           </a:p>
@@ -1935,7 +1942,7 @@
           <a:p>
             <a:fld id="{4AAD347D-5ACD-4C99-B74B-A9C85AD731AF}" type="datetimeFigureOut">
               <a:rPr lang="en-US" smtClean="0"/>
-              <a:t>5/29/2022</a:t>
+              <a:t>6/6/2022</a:t>
             </a:fld>
             <a:endParaRPr lang="en-US" dirty="0"/>
           </a:p>
@@ -2255,7 +2262,7 @@
           <a:p>
             <a:fld id="{4AAD347D-5ACD-4C99-B74B-A9C85AD731AF}" type="datetimeFigureOut">
               <a:rPr lang="en-US" smtClean="0"/>
-              <a:t>5/29/2022</a:t>
+              <a:t>6/6/2022</a:t>
             </a:fld>
             <a:endParaRPr lang="en-US" dirty="0"/>
           </a:p>
@@ -2651,7 +2658,7 @@
           <a:p>
             <a:fld id="{4AAD347D-5ACD-4C99-B74B-A9C85AD731AF}" type="datetimeFigureOut">
               <a:rPr lang="en-US" smtClean="0"/>
-              <a:t>5/29/2022</a:t>
+              <a:t>6/6/2022</a:t>
             </a:fld>
             <a:endParaRPr lang="en-US" dirty="0"/>
           </a:p>
@@ -2908,7 +2915,7 @@
           <a:p>
             <a:fld id="{4509A250-FF31-4206-8172-F9D3106AACB1}" type="datetimeFigureOut">
               <a:rPr lang="en-US" smtClean="0"/>
-              <a:t>5/29/2022</a:t>
+              <a:t>6/6/2022</a:t>
             </a:fld>
             <a:endParaRPr lang="en-US" dirty="0"/>
           </a:p>
@@ -3170,7 +3177,7 @@
           <a:p>
             <a:fld id="{4509A250-FF31-4206-8172-F9D3106AACB1}" type="datetimeFigureOut">
               <a:rPr lang="en-US" smtClean="0"/>
-              <a:t>5/29/2022</a:t>
+              <a:t>6/6/2022</a:t>
             </a:fld>
             <a:endParaRPr lang="en-US" dirty="0"/>
           </a:p>
@@ -3355,7 +3362,7 @@
           <p:cNvPr id="22" name="Hexagon 21">
             <a:extLst>
               <a:ext uri="{FF2B5EF4-FFF2-40B4-BE49-F238E27FC236}">
-                <a16:creationId xmlns:a16="http://schemas.microsoft.com/office/drawing/2014/main" xmlns="" id="{E782D618-E31A-46E2-B2EF-17C9DAB0E97E}"/>
+                <a16:creationId xmlns="" xmlns:a16="http://schemas.microsoft.com/office/drawing/2014/main" id="{E782D618-E31A-46E2-B2EF-17C9DAB0E97E}"/>
               </a:ext>
             </a:extLst>
           </p:cNvPr>
@@ -3418,7 +3425,7 @@
           <p:cNvPr id="23" name="Hexagon 22">
             <a:extLst>
               <a:ext uri="{FF2B5EF4-FFF2-40B4-BE49-F238E27FC236}">
-                <a16:creationId xmlns:a16="http://schemas.microsoft.com/office/drawing/2014/main" xmlns="" id="{531259DD-64CB-4DA1-AD6D-175D1BC0C080}"/>
+                <a16:creationId xmlns="" xmlns:a16="http://schemas.microsoft.com/office/drawing/2014/main" id="{531259DD-64CB-4DA1-AD6D-175D1BC0C080}"/>
               </a:ext>
             </a:extLst>
           </p:cNvPr>
@@ -3481,7 +3488,7 @@
           <p:cNvPr id="24" name="Hexagon 23">
             <a:extLst>
               <a:ext uri="{FF2B5EF4-FFF2-40B4-BE49-F238E27FC236}">
-                <a16:creationId xmlns:a16="http://schemas.microsoft.com/office/drawing/2014/main" xmlns="" id="{949D4368-1CD6-4BEA-A610-DE42970EA0EA}"/>
+                <a16:creationId xmlns="" xmlns:a16="http://schemas.microsoft.com/office/drawing/2014/main" id="{949D4368-1CD6-4BEA-A610-DE42970EA0EA}"/>
               </a:ext>
             </a:extLst>
           </p:cNvPr>
@@ -3544,7 +3551,7 @@
           <p:cNvPr id="25" name="Hexagon 24">
             <a:extLst>
               <a:ext uri="{FF2B5EF4-FFF2-40B4-BE49-F238E27FC236}">
-                <a16:creationId xmlns:a16="http://schemas.microsoft.com/office/drawing/2014/main" xmlns="" id="{ACAABC50-D387-484A-AA0F-EB04645F2116}"/>
+                <a16:creationId xmlns="" xmlns:a16="http://schemas.microsoft.com/office/drawing/2014/main" id="{ACAABC50-D387-484A-AA0F-EB04645F2116}"/>
               </a:ext>
             </a:extLst>
           </p:cNvPr>
@@ -3607,7 +3614,7 @@
           <p:cNvPr id="26" name="Hexagon 25">
             <a:extLst>
               <a:ext uri="{FF2B5EF4-FFF2-40B4-BE49-F238E27FC236}">
-                <a16:creationId xmlns:a16="http://schemas.microsoft.com/office/drawing/2014/main" xmlns="" id="{A9C2DD4D-CD5E-405E-A1A0-E8D0CD03D43F}"/>
+                <a16:creationId xmlns="" xmlns:a16="http://schemas.microsoft.com/office/drawing/2014/main" id="{A9C2DD4D-CD5E-405E-A1A0-E8D0CD03D43F}"/>
               </a:ext>
             </a:extLst>
           </p:cNvPr>
@@ -3670,7 +3677,7 @@
           <p:cNvPr id="9" name="Group 8">
             <a:extLst>
               <a:ext uri="{FF2B5EF4-FFF2-40B4-BE49-F238E27FC236}">
-                <a16:creationId xmlns:a16="http://schemas.microsoft.com/office/drawing/2014/main" xmlns="" id="{58F9F8B1-6BAC-4AD8-A471-D0C2B6FC88EB}"/>
+                <a16:creationId xmlns="" xmlns:a16="http://schemas.microsoft.com/office/drawing/2014/main" id="{58F9F8B1-6BAC-4AD8-A471-D0C2B6FC88EB}"/>
               </a:ext>
             </a:extLst>
           </p:cNvPr>
@@ -3690,7 +3697,7 @@
             <p:cNvPr id="38" name="Straight Connector 37">
               <a:extLst>
                 <a:ext uri="{FF2B5EF4-FFF2-40B4-BE49-F238E27FC236}">
-                  <a16:creationId xmlns:a16="http://schemas.microsoft.com/office/drawing/2014/main" xmlns="" id="{98B00A50-8F71-4989-BC6C-70721A8EDF4B}"/>
+                  <a16:creationId xmlns="" xmlns:a16="http://schemas.microsoft.com/office/drawing/2014/main" id="{98B00A50-8F71-4989-BC6C-70721A8EDF4B}"/>
                 </a:ext>
               </a:extLst>
             </p:cNvPr>
@@ -3734,7 +3741,7 @@
             <p:cNvPr id="39" name="Straight Connector 38">
               <a:extLst>
                 <a:ext uri="{FF2B5EF4-FFF2-40B4-BE49-F238E27FC236}">
-                  <a16:creationId xmlns:a16="http://schemas.microsoft.com/office/drawing/2014/main" xmlns="" id="{07D9CB32-4FF6-46E7-AD10-4891F90C114B}"/>
+                  <a16:creationId xmlns="" xmlns:a16="http://schemas.microsoft.com/office/drawing/2014/main" id="{07D9CB32-4FF6-46E7-AD10-4891F90C114B}"/>
                 </a:ext>
               </a:extLst>
             </p:cNvPr>
@@ -3778,7 +3785,7 @@
             <p:cNvPr id="45" name="Straight Connector 44">
               <a:extLst>
                 <a:ext uri="{FF2B5EF4-FFF2-40B4-BE49-F238E27FC236}">
-                  <a16:creationId xmlns:a16="http://schemas.microsoft.com/office/drawing/2014/main" xmlns="" id="{CD4C385E-0386-47EB-A5CD-8B5E6A7F9F1D}"/>
+                  <a16:creationId xmlns="" xmlns:a16="http://schemas.microsoft.com/office/drawing/2014/main" id="{CD4C385E-0386-47EB-A5CD-8B5E6A7F9F1D}"/>
                 </a:ext>
               </a:extLst>
             </p:cNvPr>
@@ -3821,7 +3828,7 @@
             <p:cNvPr id="51" name="Group 50">
               <a:extLst>
                 <a:ext uri="{FF2B5EF4-FFF2-40B4-BE49-F238E27FC236}">
-                  <a16:creationId xmlns:a16="http://schemas.microsoft.com/office/drawing/2014/main" xmlns="" id="{CA247777-17E8-47B0-9C02-A34C1E5702AD}"/>
+                  <a16:creationId xmlns="" xmlns:a16="http://schemas.microsoft.com/office/drawing/2014/main" id="{CA247777-17E8-47B0-9C02-A34C1E5702AD}"/>
                 </a:ext>
               </a:extLst>
             </p:cNvPr>
@@ -3841,7 +3848,7 @@
               <p:cNvPr id="57" name="Straight Connector 56">
                 <a:extLst>
                   <a:ext uri="{FF2B5EF4-FFF2-40B4-BE49-F238E27FC236}">
-                    <a16:creationId xmlns:a16="http://schemas.microsoft.com/office/drawing/2014/main" xmlns="" id="{ECB83C0A-AF62-4845-9EB4-5D06A0CF4372}"/>
+                    <a16:creationId xmlns="" xmlns:a16="http://schemas.microsoft.com/office/drawing/2014/main" id="{ECB83C0A-AF62-4845-9EB4-5D06A0CF4372}"/>
                   </a:ext>
                 </a:extLst>
               </p:cNvPr>
@@ -3884,7 +3891,7 @@
               <p:cNvPr id="53" name="Group 52">
                 <a:extLst>
                   <a:ext uri="{FF2B5EF4-FFF2-40B4-BE49-F238E27FC236}">
-                    <a16:creationId xmlns:a16="http://schemas.microsoft.com/office/drawing/2014/main" xmlns="" id="{32048AA9-3DFF-4A3E-8093-E7F3FB7D19E3}"/>
+                    <a16:creationId xmlns="" xmlns:a16="http://schemas.microsoft.com/office/drawing/2014/main" id="{32048AA9-3DFF-4A3E-8093-E7F3FB7D19E3}"/>
                   </a:ext>
                 </a:extLst>
               </p:cNvPr>
@@ -3904,7 +3911,7 @@
                 <p:cNvPr id="54" name="Straight Connector 53">
                   <a:extLst>
                     <a:ext uri="{FF2B5EF4-FFF2-40B4-BE49-F238E27FC236}">
-                      <a16:creationId xmlns:a16="http://schemas.microsoft.com/office/drawing/2014/main" xmlns="" id="{7392E648-DDB8-4745-B06E-3D83FB0F1F5C}"/>
+                      <a16:creationId xmlns="" xmlns:a16="http://schemas.microsoft.com/office/drawing/2014/main" id="{7392E648-DDB8-4745-B06E-3D83FB0F1F5C}"/>
                     </a:ext>
                   </a:extLst>
                 </p:cNvPr>
@@ -3947,7 +3954,7 @@
                 <p:cNvPr id="55" name="Straight Connector 54">
                   <a:extLst>
                     <a:ext uri="{FF2B5EF4-FFF2-40B4-BE49-F238E27FC236}">
-                      <a16:creationId xmlns:a16="http://schemas.microsoft.com/office/drawing/2014/main" xmlns="" id="{1478A9A5-3601-4DBF-99BF-C2F33B3CE6A5}"/>
+                      <a16:creationId xmlns="" xmlns:a16="http://schemas.microsoft.com/office/drawing/2014/main" id="{1478A9A5-3601-4DBF-99BF-C2F33B3CE6A5}"/>
                     </a:ext>
                   </a:extLst>
                 </p:cNvPr>
@@ -3992,7 +3999,7 @@
             <p:cNvPr id="59" name="Group 58">
               <a:extLst>
                 <a:ext uri="{FF2B5EF4-FFF2-40B4-BE49-F238E27FC236}">
-                  <a16:creationId xmlns:a16="http://schemas.microsoft.com/office/drawing/2014/main" xmlns="" id="{A0C33B8E-B78E-4624-BE44-B396658EC6B5}"/>
+                  <a16:creationId xmlns="" xmlns:a16="http://schemas.microsoft.com/office/drawing/2014/main" id="{A0C33B8E-B78E-4624-BE44-B396658EC6B5}"/>
                 </a:ext>
               </a:extLst>
             </p:cNvPr>
@@ -4012,7 +4019,7 @@
               <p:cNvPr id="60" name="Group 59">
                 <a:extLst>
                   <a:ext uri="{FF2B5EF4-FFF2-40B4-BE49-F238E27FC236}">
-                    <a16:creationId xmlns:a16="http://schemas.microsoft.com/office/drawing/2014/main" xmlns="" id="{36948F02-2A58-4B70-878D-138873EF5487}"/>
+                    <a16:creationId xmlns="" xmlns:a16="http://schemas.microsoft.com/office/drawing/2014/main" id="{36948F02-2A58-4B70-878D-138873EF5487}"/>
                   </a:ext>
                 </a:extLst>
               </p:cNvPr>
@@ -4032,7 +4039,7 @@
                 <p:cNvPr id="68" name="Group 67">
                   <a:extLst>
                     <a:ext uri="{FF2B5EF4-FFF2-40B4-BE49-F238E27FC236}">
-                      <a16:creationId xmlns:a16="http://schemas.microsoft.com/office/drawing/2014/main" xmlns="" id="{2374C11E-A36A-4A02-91FB-1E2A147716EF}"/>
+                      <a16:creationId xmlns="" xmlns:a16="http://schemas.microsoft.com/office/drawing/2014/main" id="{2374C11E-A36A-4A02-91FB-1E2A147716EF}"/>
                     </a:ext>
                   </a:extLst>
                 </p:cNvPr>
@@ -4052,7 +4059,7 @@
                   <p:cNvPr id="72" name="Straight Connector 71">
                     <a:extLst>
                       <a:ext uri="{FF2B5EF4-FFF2-40B4-BE49-F238E27FC236}">
-                        <a16:creationId xmlns:a16="http://schemas.microsoft.com/office/drawing/2014/main" xmlns="" id="{A7659665-8409-4C94-81A8-ED44F07985C3}"/>
+                        <a16:creationId xmlns="" xmlns:a16="http://schemas.microsoft.com/office/drawing/2014/main" id="{A7659665-8409-4C94-81A8-ED44F07985C3}"/>
                       </a:ext>
                     </a:extLst>
                   </p:cNvPr>
@@ -4095,7 +4102,7 @@
                   <p:cNvPr id="73" name="Straight Connector 72">
                     <a:extLst>
                       <a:ext uri="{FF2B5EF4-FFF2-40B4-BE49-F238E27FC236}">
-                        <a16:creationId xmlns:a16="http://schemas.microsoft.com/office/drawing/2014/main" xmlns="" id="{8CC43616-6493-4804-BA75-1DAA7A1D8B18}"/>
+                        <a16:creationId xmlns="" xmlns:a16="http://schemas.microsoft.com/office/drawing/2014/main" id="{8CC43616-6493-4804-BA75-1DAA7A1D8B18}"/>
                       </a:ext>
                     </a:extLst>
                   </p:cNvPr>
@@ -4139,7 +4146,7 @@
                 <p:cNvPr id="71" name="Straight Connector 70">
                   <a:extLst>
                     <a:ext uri="{FF2B5EF4-FFF2-40B4-BE49-F238E27FC236}">
-                      <a16:creationId xmlns:a16="http://schemas.microsoft.com/office/drawing/2014/main" xmlns="" id="{995EA5E0-F8C9-46F5-9994-0DBB5532E9C8}"/>
+                      <a16:creationId xmlns="" xmlns:a16="http://schemas.microsoft.com/office/drawing/2014/main" id="{995EA5E0-F8C9-46F5-9994-0DBB5532E9C8}"/>
                     </a:ext>
                   </a:extLst>
                 </p:cNvPr>
@@ -4183,7 +4190,7 @@
               <p:cNvPr id="61" name="Group 60">
                 <a:extLst>
                   <a:ext uri="{FF2B5EF4-FFF2-40B4-BE49-F238E27FC236}">
-                    <a16:creationId xmlns:a16="http://schemas.microsoft.com/office/drawing/2014/main" xmlns="" id="{07CCC38F-9AFC-4443-AF2B-8B972EE312B9}"/>
+                    <a16:creationId xmlns="" xmlns:a16="http://schemas.microsoft.com/office/drawing/2014/main" id="{07CCC38F-9AFC-4443-AF2B-8B972EE312B9}"/>
                   </a:ext>
                 </a:extLst>
               </p:cNvPr>
@@ -4203,7 +4210,7 @@
                 <p:cNvPr id="67" name="Straight Connector 66">
                   <a:extLst>
                     <a:ext uri="{FF2B5EF4-FFF2-40B4-BE49-F238E27FC236}">
-                      <a16:creationId xmlns:a16="http://schemas.microsoft.com/office/drawing/2014/main" xmlns="" id="{85D60560-17BE-42C4-956A-FD0CCF2B311F}"/>
+                      <a16:creationId xmlns="" xmlns:a16="http://schemas.microsoft.com/office/drawing/2014/main" id="{85D60560-17BE-42C4-956A-FD0CCF2B311F}"/>
                     </a:ext>
                   </a:extLst>
                 </p:cNvPr>
@@ -4246,7 +4253,7 @@
                 <p:cNvPr id="63" name="Group 62">
                   <a:extLst>
                     <a:ext uri="{FF2B5EF4-FFF2-40B4-BE49-F238E27FC236}">
-                      <a16:creationId xmlns:a16="http://schemas.microsoft.com/office/drawing/2014/main" xmlns="" id="{314ADB2B-6BAC-4187-9AD6-234699323C6F}"/>
+                      <a16:creationId xmlns="" xmlns:a16="http://schemas.microsoft.com/office/drawing/2014/main" id="{314ADB2B-6BAC-4187-9AD6-234699323C6F}"/>
                     </a:ext>
                   </a:extLst>
                 </p:cNvPr>
@@ -4266,7 +4273,7 @@
                   <p:cNvPr id="64" name="Straight Connector 63">
                     <a:extLst>
                       <a:ext uri="{FF2B5EF4-FFF2-40B4-BE49-F238E27FC236}">
-                        <a16:creationId xmlns:a16="http://schemas.microsoft.com/office/drawing/2014/main" xmlns="" id="{3AA32475-F311-40BF-84DB-2FBFF05A09E9}"/>
+                        <a16:creationId xmlns="" xmlns:a16="http://schemas.microsoft.com/office/drawing/2014/main" id="{3AA32475-F311-40BF-84DB-2FBFF05A09E9}"/>
                       </a:ext>
                     </a:extLst>
                   </p:cNvPr>
@@ -4309,7 +4316,7 @@
                   <p:cNvPr id="65" name="Straight Connector 64">
                     <a:extLst>
                       <a:ext uri="{FF2B5EF4-FFF2-40B4-BE49-F238E27FC236}">
-                        <a16:creationId xmlns:a16="http://schemas.microsoft.com/office/drawing/2014/main" xmlns="" id="{8076BDAC-837A-46AB-939A-33B4CAC4432D}"/>
+                        <a16:creationId xmlns="" xmlns:a16="http://schemas.microsoft.com/office/drawing/2014/main" id="{8076BDAC-837A-46AB-939A-33B4CAC4432D}"/>
                       </a:ext>
                     </a:extLst>
                   </p:cNvPr>
@@ -4355,7 +4362,7 @@
             <p:cNvPr id="41" name="Group 40">
               <a:extLst>
                 <a:ext uri="{FF2B5EF4-FFF2-40B4-BE49-F238E27FC236}">
-                  <a16:creationId xmlns:a16="http://schemas.microsoft.com/office/drawing/2014/main" xmlns="" id="{61A353AA-3B37-493F-A75A-FBE55A7FEAC3}"/>
+                  <a16:creationId xmlns="" xmlns:a16="http://schemas.microsoft.com/office/drawing/2014/main" id="{61A353AA-3B37-493F-A75A-FBE55A7FEAC3}"/>
                 </a:ext>
               </a:extLst>
             </p:cNvPr>
@@ -4375,7 +4382,7 @@
               <p:cNvPr id="76" name="Group 75">
                 <a:extLst>
                   <a:ext uri="{FF2B5EF4-FFF2-40B4-BE49-F238E27FC236}">
-                    <a16:creationId xmlns:a16="http://schemas.microsoft.com/office/drawing/2014/main" xmlns="" id="{E7AC040A-1737-484C-8CEA-2ADF0DBFE9FB}"/>
+                    <a16:creationId xmlns="" xmlns:a16="http://schemas.microsoft.com/office/drawing/2014/main" id="{E7AC040A-1737-484C-8CEA-2ADF0DBFE9FB}"/>
                   </a:ext>
                 </a:extLst>
               </p:cNvPr>
@@ -4395,7 +4402,7 @@
                 <p:cNvPr id="80" name="Straight Connector 79">
                   <a:extLst>
                     <a:ext uri="{FF2B5EF4-FFF2-40B4-BE49-F238E27FC236}">
-                      <a16:creationId xmlns:a16="http://schemas.microsoft.com/office/drawing/2014/main" xmlns="" id="{9CD9887E-CE43-4192-9065-D2A75389118E}"/>
+                      <a16:creationId xmlns="" xmlns:a16="http://schemas.microsoft.com/office/drawing/2014/main" id="{9CD9887E-CE43-4192-9065-D2A75389118E}"/>
                     </a:ext>
                   </a:extLst>
                 </p:cNvPr>
@@ -4438,7 +4445,7 @@
                 <p:cNvPr id="81" name="Straight Connector 80">
                   <a:extLst>
                     <a:ext uri="{FF2B5EF4-FFF2-40B4-BE49-F238E27FC236}">
-                      <a16:creationId xmlns:a16="http://schemas.microsoft.com/office/drawing/2014/main" xmlns="" id="{3D14A159-829D-4CE4-9A8E-E2C0CBD3F3F7}"/>
+                      <a16:creationId xmlns="" xmlns:a16="http://schemas.microsoft.com/office/drawing/2014/main" id="{3D14A159-829D-4CE4-9A8E-E2C0CBD3F3F7}"/>
                     </a:ext>
                   </a:extLst>
                 </p:cNvPr>
@@ -4482,7 +4489,7 @@
               <p:cNvPr id="77" name="Group 76">
                 <a:extLst>
                   <a:ext uri="{FF2B5EF4-FFF2-40B4-BE49-F238E27FC236}">
-                    <a16:creationId xmlns:a16="http://schemas.microsoft.com/office/drawing/2014/main" xmlns="" id="{31D099CA-B8FD-4314-AEDD-819F910D5BDB}"/>
+                    <a16:creationId xmlns="" xmlns:a16="http://schemas.microsoft.com/office/drawing/2014/main" id="{31D099CA-B8FD-4314-AEDD-819F910D5BDB}"/>
                   </a:ext>
                 </a:extLst>
               </p:cNvPr>
@@ -4502,7 +4509,7 @@
                 <p:cNvPr id="78" name="Straight Connector 77">
                   <a:extLst>
                     <a:ext uri="{FF2B5EF4-FFF2-40B4-BE49-F238E27FC236}">
-                      <a16:creationId xmlns:a16="http://schemas.microsoft.com/office/drawing/2014/main" xmlns="" id="{C02C6F16-E0CD-428F-BD21-449948C9D678}"/>
+                      <a16:creationId xmlns="" xmlns:a16="http://schemas.microsoft.com/office/drawing/2014/main" id="{C02C6F16-E0CD-428F-BD21-449948C9D678}"/>
                     </a:ext>
                   </a:extLst>
                 </p:cNvPr>
@@ -4545,7 +4552,7 @@
                 <p:cNvPr id="79" name="Straight Connector 78">
                   <a:extLst>
                     <a:ext uri="{FF2B5EF4-FFF2-40B4-BE49-F238E27FC236}">
-                      <a16:creationId xmlns:a16="http://schemas.microsoft.com/office/drawing/2014/main" xmlns="" id="{E6C222D2-654F-4BD1-A0BD-34C233CD23D3}"/>
+                      <a16:creationId xmlns="" xmlns:a16="http://schemas.microsoft.com/office/drawing/2014/main" id="{E6C222D2-654F-4BD1-A0BD-34C233CD23D3}"/>
                     </a:ext>
                   </a:extLst>
                 </p:cNvPr>
@@ -4591,7 +4598,7 @@
           <p:cNvPr id="3" name="Oval 2">
             <a:extLst>
               <a:ext uri="{FF2B5EF4-FFF2-40B4-BE49-F238E27FC236}">
-                <a16:creationId xmlns:a16="http://schemas.microsoft.com/office/drawing/2014/main" xmlns="" id="{EA93BAA0-B72B-4BFD-BCF9-4608ADE3AC72}"/>
+                <a16:creationId xmlns="" xmlns:a16="http://schemas.microsoft.com/office/drawing/2014/main" id="{EA93BAA0-B72B-4BFD-BCF9-4608ADE3AC72}"/>
               </a:ext>
             </a:extLst>
           </p:cNvPr>
@@ -4645,7 +4652,7 @@
           <p:cNvPr id="82" name="Oval 81">
             <a:extLst>
               <a:ext uri="{FF2B5EF4-FFF2-40B4-BE49-F238E27FC236}">
-                <a16:creationId xmlns:a16="http://schemas.microsoft.com/office/drawing/2014/main" xmlns="" id="{07EC39C5-C4D5-4BE2-80A8-355FC3ECC12F}"/>
+                <a16:creationId xmlns="" xmlns:a16="http://schemas.microsoft.com/office/drawing/2014/main" id="{07EC39C5-C4D5-4BE2-80A8-355FC3ECC12F}"/>
               </a:ext>
             </a:extLst>
           </p:cNvPr>
@@ -4699,7 +4706,7 @@
           <p:cNvPr id="83" name="Oval 82">
             <a:extLst>
               <a:ext uri="{FF2B5EF4-FFF2-40B4-BE49-F238E27FC236}">
-                <a16:creationId xmlns:a16="http://schemas.microsoft.com/office/drawing/2014/main" xmlns="" id="{F5775AD5-ACEB-4CBE-BD90-53D7E05FA5AC}"/>
+                <a16:creationId xmlns="" xmlns:a16="http://schemas.microsoft.com/office/drawing/2014/main" id="{F5775AD5-ACEB-4CBE-BD90-53D7E05FA5AC}"/>
               </a:ext>
             </a:extLst>
           </p:cNvPr>
@@ -4753,7 +4760,7 @@
           <p:cNvPr id="84" name="Oval 83">
             <a:extLst>
               <a:ext uri="{FF2B5EF4-FFF2-40B4-BE49-F238E27FC236}">
-                <a16:creationId xmlns:a16="http://schemas.microsoft.com/office/drawing/2014/main" xmlns="" id="{658774E0-9642-4F13-A5E6-09E3CB03DBB5}"/>
+                <a16:creationId xmlns="" xmlns:a16="http://schemas.microsoft.com/office/drawing/2014/main" id="{658774E0-9642-4F13-A5E6-09E3CB03DBB5}"/>
               </a:ext>
             </a:extLst>
           </p:cNvPr>
@@ -4807,7 +4814,7 @@
           <p:cNvPr id="85" name="Oval 84">
             <a:extLst>
               <a:ext uri="{FF2B5EF4-FFF2-40B4-BE49-F238E27FC236}">
-                <a16:creationId xmlns:a16="http://schemas.microsoft.com/office/drawing/2014/main" xmlns="" id="{D65EF3DD-F676-4685-9875-B94CF9FB2C8D}"/>
+                <a16:creationId xmlns="" xmlns:a16="http://schemas.microsoft.com/office/drawing/2014/main" id="{D65EF3DD-F676-4685-9875-B94CF9FB2C8D}"/>
               </a:ext>
             </a:extLst>
           </p:cNvPr>
@@ -4861,7 +4868,7 @@
           <p:cNvPr id="86" name="Oval 85">
             <a:extLst>
               <a:ext uri="{FF2B5EF4-FFF2-40B4-BE49-F238E27FC236}">
-                <a16:creationId xmlns:a16="http://schemas.microsoft.com/office/drawing/2014/main" xmlns="" id="{160A3CDF-ADAF-4527-8705-2F8E3851CF65}"/>
+                <a16:creationId xmlns="" xmlns:a16="http://schemas.microsoft.com/office/drawing/2014/main" id="{160A3CDF-ADAF-4527-8705-2F8E3851CF65}"/>
               </a:ext>
             </a:extLst>
           </p:cNvPr>
@@ -4915,7 +4922,7 @@
           <p:cNvPr id="87" name="Oval 86">
             <a:extLst>
               <a:ext uri="{FF2B5EF4-FFF2-40B4-BE49-F238E27FC236}">
-                <a16:creationId xmlns:a16="http://schemas.microsoft.com/office/drawing/2014/main" xmlns="" id="{3FD028A3-58B1-44C9-AC6A-A869FC68B50F}"/>
+                <a16:creationId xmlns="" xmlns:a16="http://schemas.microsoft.com/office/drawing/2014/main" id="{3FD028A3-58B1-44C9-AC6A-A869FC68B50F}"/>
               </a:ext>
             </a:extLst>
           </p:cNvPr>
@@ -4969,7 +4976,7 @@
           <p:cNvPr id="30" name="Title 29">
             <a:extLst>
               <a:ext uri="{FF2B5EF4-FFF2-40B4-BE49-F238E27FC236}">
-                <a16:creationId xmlns:a16="http://schemas.microsoft.com/office/drawing/2014/main" xmlns="" id="{18F0CF87-D85A-411D-8002-1157A047CBEF}"/>
+                <a16:creationId xmlns="" xmlns:a16="http://schemas.microsoft.com/office/drawing/2014/main" id="{18F0CF87-D85A-411D-8002-1157A047CBEF}"/>
               </a:ext>
             </a:extLst>
           </p:cNvPr>
@@ -5012,7 +5019,7 @@
           <p:cNvPr id="31" name="TextBox 30">
             <a:extLst>
               <a:ext uri="{FF2B5EF4-FFF2-40B4-BE49-F238E27FC236}">
-                <a16:creationId xmlns:a16="http://schemas.microsoft.com/office/drawing/2014/main" xmlns="" id="{9E8F9015-A4A2-47D3-9665-686A67F0ED81}"/>
+                <a16:creationId xmlns="" xmlns:a16="http://schemas.microsoft.com/office/drawing/2014/main" id="{9E8F9015-A4A2-47D3-9665-686A67F0ED81}"/>
               </a:ext>
             </a:extLst>
           </p:cNvPr>
@@ -5059,7 +5066,7 @@
           <p:cNvPr id="103" name="TextBox 102">
             <a:extLst>
               <a:ext uri="{FF2B5EF4-FFF2-40B4-BE49-F238E27FC236}">
-                <a16:creationId xmlns:a16="http://schemas.microsoft.com/office/drawing/2014/main" xmlns="" id="{426A1182-EDE9-44E7-BA1C-CCAA1B422C3C}"/>
+                <a16:creationId xmlns="" xmlns:a16="http://schemas.microsoft.com/office/drawing/2014/main" id="{426A1182-EDE9-44E7-BA1C-CCAA1B422C3C}"/>
               </a:ext>
             </a:extLst>
           </p:cNvPr>
@@ -5106,7 +5113,7 @@
           <p:cNvPr id="104" name="TextBox 103">
             <a:extLst>
               <a:ext uri="{FF2B5EF4-FFF2-40B4-BE49-F238E27FC236}">
-                <a16:creationId xmlns:a16="http://schemas.microsoft.com/office/drawing/2014/main" xmlns="" id="{453D0452-E8F6-4E1D-8D89-47F4DE14020B}"/>
+                <a16:creationId xmlns="" xmlns:a16="http://schemas.microsoft.com/office/drawing/2014/main" id="{453D0452-E8F6-4E1D-8D89-47F4DE14020B}"/>
               </a:ext>
             </a:extLst>
           </p:cNvPr>
@@ -5153,7 +5160,7 @@
           <p:cNvPr id="105" name="TextBox 104">
             <a:extLst>
               <a:ext uri="{FF2B5EF4-FFF2-40B4-BE49-F238E27FC236}">
-                <a16:creationId xmlns:a16="http://schemas.microsoft.com/office/drawing/2014/main" xmlns="" id="{58EE8165-DF59-42CB-A646-DBDAB53967B1}"/>
+                <a16:creationId xmlns="" xmlns:a16="http://schemas.microsoft.com/office/drawing/2014/main" id="{58EE8165-DF59-42CB-A646-DBDAB53967B1}"/>
               </a:ext>
             </a:extLst>
           </p:cNvPr>
@@ -5200,7 +5207,7 @@
           <p:cNvPr id="106" name="TextBox 105">
             <a:extLst>
               <a:ext uri="{FF2B5EF4-FFF2-40B4-BE49-F238E27FC236}">
-                <a16:creationId xmlns:a16="http://schemas.microsoft.com/office/drawing/2014/main" xmlns="" id="{3EC5584D-5A50-4F4A-A8CD-530EFB27FD79}"/>
+                <a16:creationId xmlns="" xmlns:a16="http://schemas.microsoft.com/office/drawing/2014/main" id="{3EC5584D-5A50-4F4A-A8CD-530EFB27FD79}"/>
               </a:ext>
             </a:extLst>
           </p:cNvPr>
@@ -5247,7 +5254,7 @@
           <p:cNvPr id="35" name="Text Placeholder 34">
             <a:extLst>
               <a:ext uri="{FF2B5EF4-FFF2-40B4-BE49-F238E27FC236}">
-                <a16:creationId xmlns:a16="http://schemas.microsoft.com/office/drawing/2014/main" xmlns="" id="{FF7EDF04-AD2B-463F-873D-F9F513090E6C}"/>
+                <a16:creationId xmlns="" xmlns:a16="http://schemas.microsoft.com/office/drawing/2014/main" id="{FF7EDF04-AD2B-463F-873D-F9F513090E6C}"/>
               </a:ext>
             </a:extLst>
           </p:cNvPr>
@@ -5295,7 +5302,7 @@
           <p:cNvPr id="107" name="Text Placeholder 34">
             <a:extLst>
               <a:ext uri="{FF2B5EF4-FFF2-40B4-BE49-F238E27FC236}">
-                <a16:creationId xmlns:a16="http://schemas.microsoft.com/office/drawing/2014/main" xmlns="" id="{7F70B278-4654-46AC-8DD6-824CEF1DFAFB}"/>
+                <a16:creationId xmlns="" xmlns:a16="http://schemas.microsoft.com/office/drawing/2014/main" id="{7F70B278-4654-46AC-8DD6-824CEF1DFAFB}"/>
               </a:ext>
             </a:extLst>
           </p:cNvPr>
@@ -5343,7 +5350,7 @@
           <p:cNvPr id="108" name="Text Placeholder 34">
             <a:extLst>
               <a:ext uri="{FF2B5EF4-FFF2-40B4-BE49-F238E27FC236}">
-                <a16:creationId xmlns:a16="http://schemas.microsoft.com/office/drawing/2014/main" xmlns="" id="{3B7069E5-61AE-4AB2-8653-98A7F283E09B}"/>
+                <a16:creationId xmlns="" xmlns:a16="http://schemas.microsoft.com/office/drawing/2014/main" id="{3B7069E5-61AE-4AB2-8653-98A7F283E09B}"/>
               </a:ext>
             </a:extLst>
           </p:cNvPr>
@@ -5391,7 +5398,7 @@
           <p:cNvPr id="109" name="Text Placeholder 34">
             <a:extLst>
               <a:ext uri="{FF2B5EF4-FFF2-40B4-BE49-F238E27FC236}">
-                <a16:creationId xmlns:a16="http://schemas.microsoft.com/office/drawing/2014/main" xmlns="" id="{38A8EB30-9561-4857-91EC-C9B25464AFDE}"/>
+                <a16:creationId xmlns="" xmlns:a16="http://schemas.microsoft.com/office/drawing/2014/main" id="{38A8EB30-9561-4857-91EC-C9B25464AFDE}"/>
               </a:ext>
             </a:extLst>
           </p:cNvPr>
@@ -5439,7 +5446,7 @@
           <p:cNvPr id="110" name="Text Placeholder 34">
             <a:extLst>
               <a:ext uri="{FF2B5EF4-FFF2-40B4-BE49-F238E27FC236}">
-                <a16:creationId xmlns:a16="http://schemas.microsoft.com/office/drawing/2014/main" xmlns="" id="{AE1932D4-1CD4-4631-9E96-954227141C8A}"/>
+                <a16:creationId xmlns="" xmlns:a16="http://schemas.microsoft.com/office/drawing/2014/main" id="{AE1932D4-1CD4-4631-9E96-954227141C8A}"/>
               </a:ext>
             </a:extLst>
           </p:cNvPr>
@@ -5487,7 +5494,7 @@
           <p:cNvPr id="111" name="Text Placeholder 34">
             <a:extLst>
               <a:ext uri="{FF2B5EF4-FFF2-40B4-BE49-F238E27FC236}">
-                <a16:creationId xmlns:a16="http://schemas.microsoft.com/office/drawing/2014/main" xmlns="" id="{7A6D526A-E91A-4FC8-8AB8-5FEA321F6ADC}"/>
+                <a16:creationId xmlns="" xmlns:a16="http://schemas.microsoft.com/office/drawing/2014/main" id="{7A6D526A-E91A-4FC8-8AB8-5FEA321F6ADC}"/>
               </a:ext>
             </a:extLst>
           </p:cNvPr>
@@ -5535,7 +5542,7 @@
           <p:cNvPr id="112" name="Text Placeholder 34">
             <a:extLst>
               <a:ext uri="{FF2B5EF4-FFF2-40B4-BE49-F238E27FC236}">
-                <a16:creationId xmlns:a16="http://schemas.microsoft.com/office/drawing/2014/main" xmlns="" id="{61A32F9F-4ACF-442A-8853-0E4B42CC9EF2}"/>
+                <a16:creationId xmlns="" xmlns:a16="http://schemas.microsoft.com/office/drawing/2014/main" id="{61A32F9F-4ACF-442A-8853-0E4B42CC9EF2}"/>
               </a:ext>
             </a:extLst>
           </p:cNvPr>
@@ -5583,7 +5590,7 @@
           <p:cNvPr id="113" name="Text Placeholder 34">
             <a:extLst>
               <a:ext uri="{FF2B5EF4-FFF2-40B4-BE49-F238E27FC236}">
-                <a16:creationId xmlns:a16="http://schemas.microsoft.com/office/drawing/2014/main" xmlns="" id="{B3D0AD38-B8DA-4C19-97D0-C4BF494F2F0B}"/>
+                <a16:creationId xmlns="" xmlns:a16="http://schemas.microsoft.com/office/drawing/2014/main" id="{B3D0AD38-B8DA-4C19-97D0-C4BF494F2F0B}"/>
               </a:ext>
             </a:extLst>
           </p:cNvPr>
@@ -5631,7 +5638,7 @@
           <p:cNvPr id="114" name="Text Placeholder 34">
             <a:extLst>
               <a:ext uri="{FF2B5EF4-FFF2-40B4-BE49-F238E27FC236}">
-                <a16:creationId xmlns:a16="http://schemas.microsoft.com/office/drawing/2014/main" xmlns="" id="{A8DE427E-A7F5-47D9-AA8C-5F8089A99E20}"/>
+                <a16:creationId xmlns="" xmlns:a16="http://schemas.microsoft.com/office/drawing/2014/main" id="{A8DE427E-A7F5-47D9-AA8C-5F8089A99E20}"/>
               </a:ext>
             </a:extLst>
           </p:cNvPr>
@@ -5679,7 +5686,7 @@
           <p:cNvPr id="115" name="Text Placeholder 34">
             <a:extLst>
               <a:ext uri="{FF2B5EF4-FFF2-40B4-BE49-F238E27FC236}">
-                <a16:creationId xmlns:a16="http://schemas.microsoft.com/office/drawing/2014/main" xmlns="" id="{E764A502-6D62-4133-90C7-1FE9B38E747B}"/>
+                <a16:creationId xmlns="" xmlns:a16="http://schemas.microsoft.com/office/drawing/2014/main" id="{E764A502-6D62-4133-90C7-1FE9B38E747B}"/>
               </a:ext>
             </a:extLst>
           </p:cNvPr>
@@ -5757,7 +5764,7 @@
           <p:cNvPr id="2" name="Date Placeholder 1">
             <a:extLst>
               <a:ext uri="{FF2B5EF4-FFF2-40B4-BE49-F238E27FC236}">
-                <a16:creationId xmlns:a16="http://schemas.microsoft.com/office/drawing/2014/main" xmlns="" id="{F18DBD5F-C6EC-485E-8ECE-A5152736C43A}"/>
+                <a16:creationId xmlns="" xmlns:a16="http://schemas.microsoft.com/office/drawing/2014/main" id="{F18DBD5F-C6EC-485E-8ECE-A5152736C43A}"/>
               </a:ext>
             </a:extLst>
           </p:cNvPr>
@@ -5783,7 +5790,7 @@
           <a:p>
             <a:fld id="{6EBB0E32-0304-4451-ADB8-C044457D5B85}" type="datetimeFigureOut">
               <a:rPr lang="en-US" smtClean="0"/>
-              <a:t>5/29/2022</a:t>
+              <a:t>6/6/2022</a:t>
             </a:fld>
             <a:endParaRPr lang="en-US" dirty="0"/>
           </a:p>
@@ -5794,7 +5801,7 @@
           <p:cNvPr id="3" name="Footer Placeholder 2">
             <a:extLst>
               <a:ext uri="{FF2B5EF4-FFF2-40B4-BE49-F238E27FC236}">
-                <a16:creationId xmlns:a16="http://schemas.microsoft.com/office/drawing/2014/main" xmlns="" id="{FB6C0BE6-E24A-4679-B786-AAB41ADCCD5D}"/>
+                <a16:creationId xmlns="" xmlns:a16="http://schemas.microsoft.com/office/drawing/2014/main" id="{FB6C0BE6-E24A-4679-B786-AAB41ADCCD5D}"/>
               </a:ext>
             </a:extLst>
           </p:cNvPr>
@@ -5827,7 +5834,7 @@
           <p:cNvPr id="4" name="Slide Number Placeholder 3">
             <a:extLst>
               <a:ext uri="{FF2B5EF4-FFF2-40B4-BE49-F238E27FC236}">
-                <a16:creationId xmlns:a16="http://schemas.microsoft.com/office/drawing/2014/main" xmlns="" id="{73FB9417-93D4-4C41-8E0E-1553E0B5D0CE}"/>
+                <a16:creationId xmlns="" xmlns:a16="http://schemas.microsoft.com/office/drawing/2014/main" id="{73FB9417-93D4-4C41-8E0E-1553E0B5D0CE}"/>
               </a:ext>
             </a:extLst>
           </p:cNvPr>
@@ -5864,7 +5871,7 @@
           <p:cNvPr id="6" name="Text Placeholder 5">
             <a:extLst>
               <a:ext uri="{FF2B5EF4-FFF2-40B4-BE49-F238E27FC236}">
-                <a16:creationId xmlns:a16="http://schemas.microsoft.com/office/drawing/2014/main" xmlns="" id="{CDDA0864-76C0-4E85-87E9-5EC8A002913F}"/>
+                <a16:creationId xmlns="" xmlns:a16="http://schemas.microsoft.com/office/drawing/2014/main" id="{CDDA0864-76C0-4E85-87E9-5EC8A002913F}"/>
               </a:ext>
             </a:extLst>
           </p:cNvPr>
@@ -5909,7 +5916,7 @@
           <p:cNvPr id="8" name="Title 29">
             <a:extLst>
               <a:ext uri="{FF2B5EF4-FFF2-40B4-BE49-F238E27FC236}">
-                <a16:creationId xmlns:a16="http://schemas.microsoft.com/office/drawing/2014/main" xmlns="" id="{E56AFFF7-9361-4257-83AA-A507B29EB56A}"/>
+                <a16:creationId xmlns="" xmlns:a16="http://schemas.microsoft.com/office/drawing/2014/main" id="{E56AFFF7-9361-4257-83AA-A507B29EB56A}"/>
               </a:ext>
             </a:extLst>
           </p:cNvPr>
@@ -6082,7 +6089,7 @@
           <a:p>
             <a:fld id="{4509A250-FF31-4206-8172-F9D3106AACB1}" type="datetimeFigureOut">
               <a:rPr lang="en-US" smtClean="0"/>
-              <a:t>5/29/2022</a:t>
+              <a:t>6/6/2022</a:t>
             </a:fld>
             <a:endParaRPr lang="en-US" dirty="0"/>
           </a:p>
@@ -6411,7 +6418,7 @@
           <a:p>
             <a:fld id="{9796027F-7875-4030-9381-8BD8C4F21935}" type="datetimeFigureOut">
               <a:rPr lang="en-US" smtClean="0"/>
-              <a:t>5/29/2022</a:t>
+              <a:t>6/6/2022</a:t>
             </a:fld>
             <a:endParaRPr lang="en-US" dirty="0"/>
           </a:p>
@@ -6734,7 +6741,7 @@
           <a:p>
             <a:fld id="{9796027F-7875-4030-9381-8BD8C4F21935}" type="datetimeFigureOut">
               <a:rPr lang="en-US" smtClean="0"/>
-              <a:t>5/29/2022</a:t>
+              <a:t>6/6/2022</a:t>
             </a:fld>
             <a:endParaRPr lang="en-US" dirty="0"/>
           </a:p>
@@ -7191,7 +7198,7 @@
           <a:p>
             <a:fld id="{9796027F-7875-4030-9381-8BD8C4F21935}" type="datetimeFigureOut">
               <a:rPr lang="en-US" smtClean="0"/>
-              <a:t>5/29/2022</a:t>
+              <a:t>6/6/2022</a:t>
             </a:fld>
             <a:endParaRPr lang="en-US" dirty="0"/>
           </a:p>
@@ -7396,7 +7403,7 @@
           <a:p>
             <a:fld id="{4509A250-FF31-4206-8172-F9D3106AACB1}" type="datetimeFigureOut">
               <a:rPr lang="en-US" smtClean="0"/>
-              <a:t>5/29/2022</a:t>
+              <a:t>6/6/2022</a:t>
             </a:fld>
             <a:endParaRPr lang="en-US" dirty="0"/>
           </a:p>
@@ -7573,7 +7580,7 @@
           <a:p>
             <a:fld id="{4509A250-FF31-4206-8172-F9D3106AACB1}" type="datetimeFigureOut">
               <a:rPr lang="en-US" smtClean="0"/>
-              <a:t>5/29/2022</a:t>
+              <a:t>6/6/2022</a:t>
             </a:fld>
             <a:endParaRPr lang="en-US" dirty="0"/>
           </a:p>
@@ -7906,7 +7913,7 @@
           <a:p>
             <a:fld id="{4509A250-FF31-4206-8172-F9D3106AACB1}" type="datetimeFigureOut">
               <a:rPr lang="en-US" smtClean="0"/>
-              <a:t>5/29/2022</a:t>
+              <a:t>6/6/2022</a:t>
             </a:fld>
             <a:endParaRPr lang="en-US" dirty="0"/>
           </a:p>
@@ -8251,7 +8258,7 @@
           <a:p>
             <a:fld id="{4509A250-FF31-4206-8172-F9D3106AACB1}" type="datetimeFigureOut">
               <a:rPr lang="en-US" smtClean="0"/>
-              <a:t>5/29/2022</a:t>
+              <a:t>6/6/2022</a:t>
             </a:fld>
             <a:endParaRPr lang="en-US" dirty="0"/>
           </a:p>
@@ -10368,7 +10375,7 @@
           <a:p>
             <a:fld id="{4AAD347D-5ACD-4C99-B74B-A9C85AD731AF}" type="datetimeFigureOut">
               <a:rPr lang="en-US" smtClean="0"/>
-              <a:t>5/29/2022</a:t>
+              <a:t>6/6/2022</a:t>
             </a:fld>
             <a:endParaRPr lang="en-US" dirty="0"/>
           </a:p>
@@ -10892,7 +10899,7 @@
           <p:cNvPr id="4" name="Title 3">
             <a:extLst>
               <a:ext uri="{FF2B5EF4-FFF2-40B4-BE49-F238E27FC236}">
-                <a16:creationId xmlns:a16="http://schemas.microsoft.com/office/drawing/2014/main" xmlns="" id="{07C74F4C-78ED-4AFC-BEB8-A0EADB60E5C8}"/>
+                <a16:creationId xmlns="" xmlns:a16="http://schemas.microsoft.com/office/drawing/2014/main" id="{07C74F4C-78ED-4AFC-BEB8-A0EADB60E5C8}"/>
               </a:ext>
             </a:extLst>
           </p:cNvPr>
@@ -10922,7 +10929,7 @@
           <p:cNvPr id="5" name="Text Placeholder 4">
             <a:extLst>
               <a:ext uri="{FF2B5EF4-FFF2-40B4-BE49-F238E27FC236}">
-                <a16:creationId xmlns:a16="http://schemas.microsoft.com/office/drawing/2014/main" xmlns="" id="{13B92369-599A-4F81-A928-2DF2B9E096A3}"/>
+                <a16:creationId xmlns="" xmlns:a16="http://schemas.microsoft.com/office/drawing/2014/main" id="{13B92369-599A-4F81-A928-2DF2B9E096A3}"/>
               </a:ext>
             </a:extLst>
           </p:cNvPr>
@@ -10953,7 +10960,7 @@
           <p:cNvPr id="6" name="Text Placeholder 5">
             <a:extLst>
               <a:ext uri="{FF2B5EF4-FFF2-40B4-BE49-F238E27FC236}">
-                <a16:creationId xmlns:a16="http://schemas.microsoft.com/office/drawing/2014/main" xmlns="" id="{DDF732AD-9B2B-4AB7-A555-574842C41F0F}"/>
+                <a16:creationId xmlns="" xmlns:a16="http://schemas.microsoft.com/office/drawing/2014/main" id="{DDF732AD-9B2B-4AB7-A555-574842C41F0F}"/>
               </a:ext>
             </a:extLst>
           </p:cNvPr>
@@ -10984,7 +10991,7 @@
           <p:cNvPr id="7" name="Text Placeholder 6">
             <a:extLst>
               <a:ext uri="{FF2B5EF4-FFF2-40B4-BE49-F238E27FC236}">
-                <a16:creationId xmlns:a16="http://schemas.microsoft.com/office/drawing/2014/main" xmlns="" id="{7E698899-451C-4012-A03B-438076B22A0B}"/>
+                <a16:creationId xmlns="" xmlns:a16="http://schemas.microsoft.com/office/drawing/2014/main" id="{7E698899-451C-4012-A03B-438076B22A0B}"/>
               </a:ext>
             </a:extLst>
           </p:cNvPr>
@@ -11015,7 +11022,7 @@
           <p:cNvPr id="8" name="Text Placeholder 7">
             <a:extLst>
               <a:ext uri="{FF2B5EF4-FFF2-40B4-BE49-F238E27FC236}">
-                <a16:creationId xmlns:a16="http://schemas.microsoft.com/office/drawing/2014/main" xmlns="" id="{1542ED92-E0E5-43BF-A314-F5F899A21C00}"/>
+                <a16:creationId xmlns="" xmlns:a16="http://schemas.microsoft.com/office/drawing/2014/main" id="{1542ED92-E0E5-43BF-A314-F5F899A21C00}"/>
               </a:ext>
             </a:extLst>
           </p:cNvPr>
@@ -11046,7 +11053,7 @@
           <p:cNvPr id="9" name="Text Placeholder 8">
             <a:extLst>
               <a:ext uri="{FF2B5EF4-FFF2-40B4-BE49-F238E27FC236}">
-                <a16:creationId xmlns:a16="http://schemas.microsoft.com/office/drawing/2014/main" xmlns="" id="{A45D0C56-3BA5-487F-850D-EDB088C97387}"/>
+                <a16:creationId xmlns="" xmlns:a16="http://schemas.microsoft.com/office/drawing/2014/main" id="{A45D0C56-3BA5-487F-850D-EDB088C97387}"/>
               </a:ext>
             </a:extLst>
           </p:cNvPr>
@@ -11077,7 +11084,7 @@
           <p:cNvPr id="10" name="Text Placeholder 9">
             <a:extLst>
               <a:ext uri="{FF2B5EF4-FFF2-40B4-BE49-F238E27FC236}">
-                <a16:creationId xmlns:a16="http://schemas.microsoft.com/office/drawing/2014/main" xmlns="" id="{7F91FCB5-969A-4197-B988-F9A876336008}"/>
+                <a16:creationId xmlns="" xmlns:a16="http://schemas.microsoft.com/office/drawing/2014/main" id="{7F91FCB5-969A-4197-B988-F9A876336008}"/>
               </a:ext>
             </a:extLst>
           </p:cNvPr>
@@ -11108,7 +11115,7 @@
           <p:cNvPr id="11" name="Text Placeholder 10">
             <a:extLst>
               <a:ext uri="{FF2B5EF4-FFF2-40B4-BE49-F238E27FC236}">
-                <a16:creationId xmlns:a16="http://schemas.microsoft.com/office/drawing/2014/main" xmlns="" id="{168B0C2B-3695-4D6A-AED2-61B1E08049F0}"/>
+                <a16:creationId xmlns="" xmlns:a16="http://schemas.microsoft.com/office/drawing/2014/main" id="{168B0C2B-3695-4D6A-AED2-61B1E08049F0}"/>
               </a:ext>
             </a:extLst>
           </p:cNvPr>
@@ -11139,7 +11146,7 @@
           <p:cNvPr id="12" name="Text Placeholder 11">
             <a:extLst>
               <a:ext uri="{FF2B5EF4-FFF2-40B4-BE49-F238E27FC236}">
-                <a16:creationId xmlns:a16="http://schemas.microsoft.com/office/drawing/2014/main" xmlns="" id="{1B10BBD8-0C9D-4B4E-855D-EE1802746879}"/>
+                <a16:creationId xmlns="" xmlns:a16="http://schemas.microsoft.com/office/drawing/2014/main" id="{1B10BBD8-0C9D-4B4E-855D-EE1802746879}"/>
               </a:ext>
             </a:extLst>
           </p:cNvPr>
@@ -11159,15 +11166,7 @@
           <a:p>
             <a:r>
               <a:rPr lang="en-US" dirty="0" smtClean="0"/>
-              <a:t>Removing Redundant</a:t>
-            </a:r>
-            <a:r>
-              <a:rPr lang="en-US" dirty="0" smtClean="0"/>
-              <a:t> </a:t>
-            </a:r>
-            <a:r>
-              <a:rPr lang="en-US" dirty="0" smtClean="0"/>
-              <a:t>variables</a:t>
+              <a:t>Removing Redundant variables</a:t>
             </a:r>
           </a:p>
           <a:p>
@@ -11190,7 +11189,7 @@
           <p:cNvPr id="13" name="Text Placeholder 12">
             <a:extLst>
               <a:ext uri="{FF2B5EF4-FFF2-40B4-BE49-F238E27FC236}">
-                <a16:creationId xmlns:a16="http://schemas.microsoft.com/office/drawing/2014/main" xmlns="" id="{CA59AE5F-3A9D-4E5B-BE20-3802EE56C05F}"/>
+                <a16:creationId xmlns="" xmlns:a16="http://schemas.microsoft.com/office/drawing/2014/main" id="{CA59AE5F-3A9D-4E5B-BE20-3802EE56C05F}"/>
               </a:ext>
             </a:extLst>
           </p:cNvPr>
@@ -11221,7 +11220,7 @@
           <p:cNvPr id="14" name="Text Placeholder 13">
             <a:extLst>
               <a:ext uri="{FF2B5EF4-FFF2-40B4-BE49-F238E27FC236}">
-                <a16:creationId xmlns:a16="http://schemas.microsoft.com/office/drawing/2014/main" xmlns="" id="{9EFD1FD8-37C4-4591-A698-CB3B4B2DE0DD}"/>
+                <a16:creationId xmlns="" xmlns:a16="http://schemas.microsoft.com/office/drawing/2014/main" id="{9EFD1FD8-37C4-4591-A698-CB3B4B2DE0DD}"/>
               </a:ext>
             </a:extLst>
           </p:cNvPr>
@@ -11648,146 +11647,148 @@
       </p:grpSpPr>
       <p:sp>
         <p:nvSpPr>
-          <p:cNvPr id="2" name="Text Placeholder 1"/>
-          <p:cNvSpPr>
-            <a:spLocks noGrp="1"/>
-          </p:cNvSpPr>
-          <p:nvPr>
-            <p:ph type="body" sz="quarter" idx="13"/>
-          </p:nvPr>
-        </p:nvSpPr>
-        <p:spPr/>
+          <p:cNvPr id="2" name="Title 1"/>
+          <p:cNvSpPr>
+            <a:spLocks noGrp="1"/>
+          </p:cNvSpPr>
+          <p:nvPr>
+            <p:ph type="title"/>
+          </p:nvPr>
+        </p:nvSpPr>
+        <p:spPr>
+          <a:xfrm>
+            <a:off x="2600325" y="624110"/>
+            <a:ext cx="8904286" cy="704628"/>
+          </a:xfrm>
+        </p:spPr>
         <p:txBody>
           <a:bodyPr/>
           <a:lstStyle/>
           <a:p>
-            <a:endParaRPr lang="en-CA"/>
+            <a:pPr algn="ctr"/>
+            <a:r>
+              <a:rPr lang="en-CA" dirty="0" smtClean="0"/>
+              <a:t>COLLISIONS BY YEAR</a:t>
+            </a:r>
+            <a:endParaRPr lang="en-CA" dirty="0"/>
+          </a:p>
+        </p:txBody>
+      </p:sp>
+      <p:sp>
+        <p:nvSpPr>
+          <p:cNvPr id="3" name="Text Placeholder 2"/>
+          <p:cNvSpPr>
+            <a:spLocks noGrp="1"/>
+          </p:cNvSpPr>
+          <p:nvPr>
+            <p:ph type="body" idx="1"/>
+          </p:nvPr>
+        </p:nvSpPr>
+        <p:spPr>
+          <a:xfrm>
+            <a:off x="2939881" y="1328738"/>
+            <a:ext cx="3992732" cy="576262"/>
+          </a:xfrm>
+        </p:spPr>
+        <p:txBody>
+          <a:bodyPr/>
+          <a:lstStyle/>
+          <a:p>
+            <a:r>
+              <a:rPr lang="en-CA" dirty="0" smtClean="0"/>
+              <a:t>Red Light Camera</a:t>
+            </a:r>
+            <a:endParaRPr lang="en-CA" dirty="0"/>
           </a:p>
         </p:txBody>
       </p:sp>
       <p:pic>
         <p:nvPicPr>
-          <p:cNvPr id="5" name="Picture 4"/>
+          <p:cNvPr id="7" name="Content Placeholder 6"/>
           <p:cNvPicPr>
-            <a:picLocks noChangeAspect="1"/>
+            <a:picLocks noGrp="1" noChangeAspect="1"/>
           </p:cNvPicPr>
-          <p:nvPr/>
+          <p:nvPr>
+            <p:ph sz="half" idx="2"/>
+          </p:nvPr>
         </p:nvPicPr>
         <p:blipFill>
-          <a:blip r:embed="rId2">
-            <a:extLst>
-              <a:ext uri="{28A0092B-C50C-407E-A947-70E740481C1C}">
-                <a14:useLocalDpi xmlns:a14="http://schemas.microsoft.com/office/drawing/2010/main" val="0"/>
-              </a:ext>
-            </a:extLst>
-          </a:blip>
+          <a:blip r:embed="rId2"/>
           <a:stretch>
             <a:fillRect/>
           </a:stretch>
         </p:blipFill>
         <p:spPr>
           <a:xfrm>
-            <a:off x="1342866" y="1142522"/>
-            <a:ext cx="10058400" cy="5436697"/>
+            <a:off x="490329" y="2324670"/>
+            <a:ext cx="5868025" cy="4533330"/>
           </a:xfrm>
           <a:prstGeom prst="rect">
             <a:avLst/>
           </a:prstGeom>
+          <a:effectLst>
+            <a:softEdge rad="0"/>
+          </a:effectLst>
         </p:spPr>
       </p:pic>
       <p:sp>
         <p:nvSpPr>
-          <p:cNvPr id="7" name="Hexagon 6"/>
-          <p:cNvSpPr/>
-          <p:nvPr/>
-        </p:nvSpPr>
-        <p:spPr>
-          <a:xfrm>
-            <a:off x="1505415" y="187737"/>
-            <a:ext cx="9160615" cy="954785"/>
-          </a:xfrm>
-          <a:prstGeom prst="hexagon">
+          <p:cNvPr id="5" name="Text Placeholder 4"/>
+          <p:cNvSpPr>
+            <a:spLocks noGrp="1"/>
+          </p:cNvSpPr>
+          <p:nvPr>
+            <p:ph type="body" sz="quarter" idx="3"/>
+          </p:nvPr>
+        </p:nvSpPr>
+        <p:spPr>
+          <a:xfrm>
+            <a:off x="7336928" y="1328738"/>
+            <a:ext cx="4101220" cy="576262"/>
+          </a:xfrm>
+        </p:spPr>
+        <p:txBody>
+          <a:bodyPr/>
+          <a:lstStyle/>
+          <a:p>
+            <a:r>
+              <a:rPr lang="en-CA" dirty="0" smtClean="0"/>
+              <a:t>No Red Light Camera</a:t>
+            </a:r>
+            <a:endParaRPr lang="en-CA" dirty="0"/>
+          </a:p>
+        </p:txBody>
+      </p:sp>
+      <p:pic>
+        <p:nvPicPr>
+          <p:cNvPr id="8" name="Content Placeholder 7"/>
+          <p:cNvPicPr>
+            <a:picLocks noGrp="1" noChangeAspect="1"/>
+          </p:cNvPicPr>
+          <p:nvPr>
+            <p:ph sz="quarter" idx="4"/>
+          </p:nvPr>
+        </p:nvPicPr>
+        <p:blipFill>
+          <a:blip r:embed="rId3"/>
+          <a:stretch>
+            <a:fillRect/>
+          </a:stretch>
+        </p:blipFill>
+        <p:spPr>
+          <a:xfrm>
+            <a:off x="6459436" y="2324670"/>
+            <a:ext cx="5652051" cy="4533330"/>
+          </a:xfrm>
+          <a:prstGeom prst="rect">
             <a:avLst/>
           </a:prstGeom>
-          <a:solidFill>
-            <a:schemeClr val="bg2"/>
-          </a:solidFill>
-        </p:spPr>
-        <p:style>
-          <a:lnRef idx="2">
-            <a:schemeClr val="accent1">
-              <a:shade val="50000"/>
-            </a:schemeClr>
-          </a:lnRef>
-          <a:fillRef idx="1">
-            <a:schemeClr val="accent1"/>
-          </a:fillRef>
-          <a:effectRef idx="0">
-            <a:schemeClr val="accent1"/>
-          </a:effectRef>
-          <a:fontRef idx="minor">
-            <a:schemeClr val="lt1"/>
-          </a:fontRef>
-        </p:style>
-        <p:txBody>
-          <a:bodyPr rtlCol="0" anchor="ctr"/>
-          <a:lstStyle/>
-          <a:p>
-            <a:pPr algn="ctr"/>
-            <a:endParaRPr lang="en-CA"/>
-          </a:p>
-        </p:txBody>
-      </p:sp>
-      <p:sp>
-        <p:nvSpPr>
-          <p:cNvPr id="9" name="Title 2"/>
-          <p:cNvSpPr>
-            <a:spLocks noGrp="1"/>
-          </p:cNvSpPr>
-          <p:nvPr>
-            <p:ph type="title"/>
-          </p:nvPr>
-        </p:nvSpPr>
-        <p:spPr>
-          <a:xfrm>
-            <a:off x="1301843" y="166737"/>
-            <a:ext cx="9333569" cy="1019083"/>
-          </a:xfrm>
-        </p:spPr>
-        <p:txBody>
-          <a:bodyPr>
-            <a:noAutofit/>
-          </a:bodyPr>
-          <a:lstStyle/>
-          <a:p>
-            <a:pPr algn="ctr"/>
-            <a:r>
-              <a:rPr lang="en-CA" b="1" dirty="0" smtClean="0">
-                <a:latin typeface="Bodoni MT" panose="02070603080606020203" pitchFamily="18" charset="0"/>
-              </a:rPr>
-              <a:t>HEAT MAP BY WEEK FOR EACH MONTH </a:t>
-            </a:r>
-            <a:br>
-              <a:rPr lang="en-CA" b="1" dirty="0" smtClean="0">
-                <a:latin typeface="Bodoni MT" panose="02070603080606020203" pitchFamily="18" charset="0"/>
-              </a:rPr>
-            </a:br>
-            <a:r>
-              <a:rPr lang="en-CA" b="1" dirty="0" smtClean="0">
-                <a:latin typeface="Bodoni MT" panose="02070603080606020203" pitchFamily="18" charset="0"/>
-              </a:rPr>
-              <a:t>2014-2020</a:t>
-            </a:r>
-            <a:endParaRPr lang="en-CA" b="1" dirty="0">
-              <a:latin typeface="Bodoni MT" panose="02070603080606020203" pitchFamily="18" charset="0"/>
-            </a:endParaRPr>
-          </a:p>
-        </p:txBody>
-      </p:sp>
+        </p:spPr>
+      </p:pic>
     </p:spTree>
     <p:extLst>
       <p:ext uri="{BB962C8B-B14F-4D97-AF65-F5344CB8AC3E}">
-        <p14:creationId xmlns:p14="http://schemas.microsoft.com/office/powerpoint/2010/main" val="601690408"/>
+        <p14:creationId xmlns:p14="http://schemas.microsoft.com/office/powerpoint/2010/main" val="3873108175"/>
       </p:ext>
     </p:extLst>
   </p:cSld>
@@ -11823,187 +11824,151 @@
       </p:grpSpPr>
       <p:sp>
         <p:nvSpPr>
-          <p:cNvPr id="2" name="Text Placeholder 1"/>
-          <p:cNvSpPr>
-            <a:spLocks noGrp="1"/>
-          </p:cNvSpPr>
-          <p:nvPr>
-            <p:ph type="body" sz="quarter" idx="13"/>
-          </p:nvPr>
-        </p:nvSpPr>
-        <p:spPr>
-          <a:xfrm>
-            <a:off x="1438507" y="713678"/>
-            <a:ext cx="10114155" cy="6534615"/>
+          <p:cNvPr id="2" name="Title 1"/>
+          <p:cNvSpPr>
+            <a:spLocks noGrp="1"/>
+          </p:cNvSpPr>
+          <p:nvPr>
+            <p:ph type="title"/>
+          </p:nvPr>
+        </p:nvSpPr>
+        <p:spPr>
+          <a:xfrm>
+            <a:off x="1638300" y="624110"/>
+            <a:ext cx="9866311" cy="633190"/>
           </a:xfrm>
         </p:spPr>
         <p:txBody>
           <a:bodyPr>
-            <a:normAutofit/>
+            <a:normAutofit fontScale="90000"/>
           </a:bodyPr>
           <a:lstStyle/>
           <a:p>
-            <a:pPr marL="285750" indent="-285750" algn="l">
-              <a:buFont typeface="Arial" panose="020B0604020202020204" pitchFamily="34" charset="0"/>
-              <a:buChar char="•"/>
-            </a:pPr>
-            <a:endParaRPr lang="en-CA" dirty="0" smtClean="0"/>
-          </a:p>
-          <a:p>
-            <a:pPr marL="285750" indent="-285750" algn="l">
-              <a:buFont typeface="Arial" panose="020B0604020202020204" pitchFamily="34" charset="0"/>
-              <a:buChar char="•"/>
-            </a:pPr>
+            <a:pPr algn="ctr"/>
+            <a:r>
+              <a:rPr lang="en-CA" sz="3200" dirty="0" smtClean="0"/>
+              <a:t>PERCENT</a:t>
+            </a:r>
+            <a:r>
+              <a:rPr lang="en-CA" dirty="0" smtClean="0"/>
+              <a:t> OF SEVERE COLLISIONS BY YEAR</a:t>
+            </a:r>
             <a:endParaRPr lang="en-CA" dirty="0"/>
           </a:p>
-          <a:p>
-            <a:pPr marL="285750" indent="-285750" algn="l">
-              <a:buFont typeface="Arial" panose="020B0604020202020204" pitchFamily="34" charset="0"/>
-              <a:buChar char="•"/>
-            </a:pPr>
-            <a:r>
-              <a:rPr lang="en-CA" dirty="0" smtClean="0">
-                <a:latin typeface="Bodoni MT" panose="02070603080606020203" pitchFamily="18" charset="0"/>
-              </a:rPr>
-              <a:t>WE HAVE OBSERVED THAT THERE ARE MORE FATAL AND NON-FATAL ACCIDENTS IN NON-REDLIGHT CAMERAS AREA.</a:t>
-            </a:r>
-          </a:p>
-          <a:p>
-            <a:pPr marL="285750" indent="-285750" algn="l">
-              <a:buFont typeface="Arial" panose="020B0604020202020204" pitchFamily="34" charset="0"/>
-              <a:buChar char="•"/>
-            </a:pPr>
-            <a:r>
-              <a:rPr lang="en-CA" dirty="0" smtClean="0">
-                <a:latin typeface="Bodoni MT" panose="02070603080606020203" pitchFamily="18" charset="0"/>
-              </a:rPr>
-              <a:t>THERE ARE MORE PEDESTRAINS INVOLVED IN COLLISIONS</a:t>
-            </a:r>
-          </a:p>
-          <a:p>
-            <a:pPr marL="285750" indent="-285750" algn="l">
-              <a:buFont typeface="Arial" panose="020B0604020202020204" pitchFamily="34" charset="0"/>
-              <a:buChar char="•"/>
-            </a:pPr>
-            <a:r>
-              <a:rPr lang="en-CA" dirty="0" smtClean="0">
-                <a:latin typeface="Bodoni MT" panose="02070603080606020203" pitchFamily="18" charset="0"/>
-              </a:rPr>
-              <a:t>MORE ACCIDENST HAPPEN IN CLEAR VISIBILITY WHICH MEANS PEOPLE DRIVE CAREFULLY WHEN THERE IS VISIBILITIES ISSUES. </a:t>
-            </a:r>
-          </a:p>
-          <a:p>
-            <a:pPr marL="285750" indent="-285750" algn="l">
-              <a:buFont typeface="Arial" panose="020B0604020202020204" pitchFamily="34" charset="0"/>
-              <a:buChar char="•"/>
-            </a:pPr>
-            <a:r>
-              <a:rPr lang="en-CA" dirty="0" smtClean="0">
-                <a:latin typeface="Bodoni MT" panose="02070603080606020203" pitchFamily="18" charset="0"/>
-              </a:rPr>
-              <a:t>MORE ACCIDENST IN MONTH OF AUGUST AND NOVEMBER AND ON FRIDAYS.</a:t>
-            </a:r>
-          </a:p>
-          <a:p>
-            <a:endParaRPr lang="en-CA" dirty="0">
-              <a:latin typeface="Bodoni MT" panose="02070603080606020203" pitchFamily="18" charset="0"/>
-            </a:endParaRPr>
-          </a:p>
-        </p:txBody>
-      </p:sp>
-      <p:sp>
-        <p:nvSpPr>
-          <p:cNvPr id="4" name="Hexagon 3"/>
-          <p:cNvSpPr/>
-          <p:nvPr/>
-        </p:nvSpPr>
-        <p:spPr>
-          <a:xfrm>
-            <a:off x="1654782" y="334537"/>
-            <a:ext cx="9011249" cy="1717287"/>
-          </a:xfrm>
-          <a:prstGeom prst="hexagon">
+        </p:txBody>
+      </p:sp>
+      <p:sp>
+        <p:nvSpPr>
+          <p:cNvPr id="3" name="Text Placeholder 2"/>
+          <p:cNvSpPr>
+            <a:spLocks noGrp="1"/>
+          </p:cNvSpPr>
+          <p:nvPr>
+            <p:ph type="body" idx="1"/>
+          </p:nvPr>
+        </p:nvSpPr>
+        <p:spPr>
+          <a:xfrm>
+            <a:off x="1638300" y="1325256"/>
+            <a:ext cx="3992732" cy="576262"/>
+          </a:xfrm>
+        </p:spPr>
+        <p:txBody>
+          <a:bodyPr/>
+          <a:lstStyle/>
+          <a:p>
+            <a:r>
+              <a:rPr lang="en-CA" dirty="0" smtClean="0"/>
+              <a:t>Red Light Camera</a:t>
+            </a:r>
+            <a:endParaRPr lang="en-CA" dirty="0"/>
+          </a:p>
+        </p:txBody>
+      </p:sp>
+      <p:sp>
+        <p:nvSpPr>
+          <p:cNvPr id="5" name="Text Placeholder 4"/>
+          <p:cNvSpPr>
+            <a:spLocks noGrp="1"/>
+          </p:cNvSpPr>
+          <p:nvPr>
+            <p:ph type="body" sz="quarter" idx="3"/>
+          </p:nvPr>
+        </p:nvSpPr>
+        <p:spPr>
+          <a:xfrm>
+            <a:off x="7505610" y="1325256"/>
+            <a:ext cx="3999001" cy="576262"/>
+          </a:xfrm>
+        </p:spPr>
+        <p:txBody>
+          <a:bodyPr/>
+          <a:lstStyle/>
+          <a:p>
+            <a:r>
+              <a:rPr lang="en-CA" dirty="0" smtClean="0"/>
+              <a:t>NO Red Light Camera</a:t>
+            </a:r>
+            <a:endParaRPr lang="en-CA" dirty="0"/>
+          </a:p>
+        </p:txBody>
+      </p:sp>
+      <p:pic>
+        <p:nvPicPr>
+          <p:cNvPr id="11" name="Content Placeholder 10"/>
+          <p:cNvPicPr>
+            <a:picLocks noGrp="1" noChangeAspect="1"/>
+          </p:cNvPicPr>
+          <p:nvPr>
+            <p:ph sz="half" idx="2"/>
+          </p:nvPr>
+        </p:nvPicPr>
+        <p:blipFill>
+          <a:blip r:embed="rId2"/>
+          <a:stretch>
+            <a:fillRect/>
+          </a:stretch>
+        </p:blipFill>
+        <p:spPr>
+          <a:xfrm>
+            <a:off x="595223" y="2173857"/>
+            <a:ext cx="5296619" cy="4684143"/>
+          </a:xfrm>
+          <a:prstGeom prst="rect">
             <a:avLst/>
           </a:prstGeom>
-          <a:solidFill>
-            <a:schemeClr val="bg2"/>
-          </a:solidFill>
-        </p:spPr>
-        <p:style>
-          <a:lnRef idx="2">
-            <a:schemeClr val="accent1">
-              <a:shade val="50000"/>
-            </a:schemeClr>
-          </a:lnRef>
-          <a:fillRef idx="1">
-            <a:schemeClr val="accent1"/>
-          </a:fillRef>
-          <a:effectRef idx="0">
-            <a:schemeClr val="accent1"/>
-          </a:effectRef>
-          <a:fontRef idx="minor">
-            <a:schemeClr val="lt1"/>
-          </a:fontRef>
-        </p:style>
-        <p:txBody>
-          <a:bodyPr rtlCol="0" anchor="ctr"/>
-          <a:lstStyle/>
-          <a:p>
-            <a:pPr algn="ctr"/>
-            <a:endParaRPr lang="en-CA"/>
-          </a:p>
-        </p:txBody>
-      </p:sp>
-      <p:sp>
-        <p:nvSpPr>
-          <p:cNvPr id="6" name="Title 2"/>
-          <p:cNvSpPr>
-            <a:spLocks noGrp="1"/>
-          </p:cNvSpPr>
-          <p:nvPr>
-            <p:ph type="title"/>
-          </p:nvPr>
-        </p:nvSpPr>
-        <p:spPr>
-          <a:xfrm>
-            <a:off x="445401" y="-479502"/>
-            <a:ext cx="11363740" cy="3267307"/>
-          </a:xfrm>
-        </p:spPr>
-        <p:txBody>
-          <a:bodyPr>
-            <a:noAutofit/>
-          </a:bodyPr>
-          <a:lstStyle/>
-          <a:p>
-            <a:pPr algn="ctr"/>
-            <a:r>
-              <a:rPr lang="en-CA" sz="3600" b="1" dirty="0" smtClean="0">
-                <a:latin typeface="Bodoni MT" panose="02070603080606020203" pitchFamily="18" charset="0"/>
-              </a:rPr>
-              <a:t>VISUALIZATION SUMMARY</a:t>
-            </a:r>
-            <a:br>
-              <a:rPr lang="en-CA" sz="3600" b="1" dirty="0" smtClean="0">
-                <a:latin typeface="Bodoni MT" panose="02070603080606020203" pitchFamily="18" charset="0"/>
-              </a:rPr>
-            </a:br>
-            <a:r>
-              <a:rPr lang="en-CA" sz="3600" b="1" dirty="0" smtClean="0">
-                <a:latin typeface="Bodoni MT" panose="02070603080606020203" pitchFamily="18" charset="0"/>
-              </a:rPr>
-              <a:t>NON-RED LIGHT CAMERAS AREAS</a:t>
-            </a:r>
-            <a:endParaRPr lang="en-CA" sz="3600" b="1" dirty="0">
-              <a:latin typeface="Bodoni MT" panose="02070603080606020203" pitchFamily="18" charset="0"/>
-            </a:endParaRPr>
-          </a:p>
-        </p:txBody>
-      </p:sp>
+        </p:spPr>
+      </p:pic>
+      <p:pic>
+        <p:nvPicPr>
+          <p:cNvPr id="13" name="Content Placeholder 12"/>
+          <p:cNvPicPr>
+            <a:picLocks noGrp="1" noChangeAspect="1"/>
+          </p:cNvPicPr>
+          <p:nvPr>
+            <p:ph sz="quarter" idx="4"/>
+          </p:nvPr>
+        </p:nvPicPr>
+        <p:blipFill>
+          <a:blip r:embed="rId3"/>
+          <a:stretch>
+            <a:fillRect/>
+          </a:stretch>
+        </p:blipFill>
+        <p:spPr>
+          <a:xfrm>
+            <a:off x="6426679" y="2173857"/>
+            <a:ext cx="5765321" cy="4684143"/>
+          </a:xfrm>
+          <a:prstGeom prst="rect">
+            <a:avLst/>
+          </a:prstGeom>
+        </p:spPr>
+      </p:pic>
     </p:spTree>
     <p:extLst>
       <p:ext uri="{BB962C8B-B14F-4D97-AF65-F5344CB8AC3E}">
-        <p14:creationId xmlns:p14="http://schemas.microsoft.com/office/powerpoint/2010/main" val="2622664357"/>
+        <p14:creationId xmlns:p14="http://schemas.microsoft.com/office/powerpoint/2010/main" val="579130008"/>
       </p:ext>
     </p:extLst>
   </p:cSld>
@@ -12039,185 +12004,148 @@
       </p:grpSpPr>
       <p:sp>
         <p:nvSpPr>
-          <p:cNvPr id="2" name="Text Placeholder 1"/>
-          <p:cNvSpPr>
-            <a:spLocks noGrp="1"/>
-          </p:cNvSpPr>
-          <p:nvPr>
-            <p:ph type="body" sz="quarter" idx="13"/>
-          </p:nvPr>
-        </p:nvSpPr>
-        <p:spPr>
-          <a:xfrm>
-            <a:off x="1293547" y="2375784"/>
-            <a:ext cx="10203366" cy="4236891"/>
+          <p:cNvPr id="2" name="Title 1"/>
+          <p:cNvSpPr>
+            <a:spLocks noGrp="1"/>
+          </p:cNvSpPr>
+          <p:nvPr>
+            <p:ph type="title"/>
+          </p:nvPr>
+        </p:nvSpPr>
+        <p:spPr>
+          <a:xfrm>
+            <a:off x="1708030" y="624110"/>
+            <a:ext cx="9796581" cy="600841"/>
           </a:xfrm>
         </p:spPr>
         <p:txBody>
           <a:bodyPr>
-            <a:normAutofit/>
+            <a:normAutofit fontScale="90000"/>
           </a:bodyPr>
           <a:lstStyle/>
           <a:p>
-            <a:pPr marL="285750" indent="-285750" algn="l">
-              <a:buFont typeface="Arial" panose="020B0604020202020204" pitchFamily="34" charset="0"/>
-              <a:buChar char="•"/>
-            </a:pPr>
-            <a:r>
-              <a:rPr lang="en-US" sz="2800" dirty="0" smtClean="0">
-                <a:latin typeface="Bodoni MT" panose="02070603080606020203" pitchFamily="18" charset="0"/>
-              </a:rPr>
-              <a:t>Accurately </a:t>
-            </a:r>
-            <a:r>
-              <a:rPr lang="en-US" sz="2800" dirty="0">
-                <a:latin typeface="Bodoni MT" panose="02070603080606020203" pitchFamily="18" charset="0"/>
-              </a:rPr>
-              <a:t>analyzing accidents can help governments </a:t>
-            </a:r>
-            <a:r>
-              <a:rPr lang="en-US" sz="2800" dirty="0" smtClean="0">
-                <a:latin typeface="Bodoni MT" panose="02070603080606020203" pitchFamily="18" charset="0"/>
-              </a:rPr>
-              <a:t>to better </a:t>
-            </a:r>
-            <a:r>
-              <a:rPr lang="en-US" sz="2800" dirty="0">
-                <a:latin typeface="Bodoni MT" panose="02070603080606020203" pitchFamily="18" charset="0"/>
-              </a:rPr>
-              <a:t>the safety of their roads and highways. </a:t>
-            </a:r>
-          </a:p>
-          <a:p>
-            <a:pPr marL="285750" indent="-285750" algn="l">
-              <a:buFont typeface="Arial" panose="020B0604020202020204" pitchFamily="34" charset="0"/>
-              <a:buChar char="•"/>
-            </a:pPr>
-            <a:r>
-              <a:rPr lang="en-US" sz="2800" dirty="0" smtClean="0">
-                <a:latin typeface="Bodoni MT" panose="02070603080606020203" pitchFamily="18" charset="0"/>
-              </a:rPr>
-              <a:t>Identifying </a:t>
-            </a:r>
-            <a:r>
-              <a:rPr lang="en-US" sz="2800" dirty="0">
-                <a:latin typeface="Bodoni MT" panose="02070603080606020203" pitchFamily="18" charset="0"/>
-              </a:rPr>
-              <a:t>high areas of accidents and high areas of accident severity can highlight areas of concern</a:t>
-            </a:r>
-            <a:r>
-              <a:rPr lang="en-US" sz="2800" dirty="0" smtClean="0">
-                <a:latin typeface="Bodoni MT" panose="02070603080606020203" pitchFamily="18" charset="0"/>
-              </a:rPr>
-              <a:t>.</a:t>
-            </a:r>
-          </a:p>
-          <a:p>
-            <a:pPr marL="285750" indent="-285750" algn="l">
-              <a:buFont typeface="Arial" panose="020B0604020202020204" pitchFamily="34" charset="0"/>
-              <a:buChar char="•"/>
-            </a:pPr>
-            <a:r>
-              <a:rPr lang="en-US" sz="2800" dirty="0" smtClean="0">
-                <a:latin typeface="Bodoni MT" panose="02070603080606020203" pitchFamily="18" charset="0"/>
-              </a:rPr>
-              <a:t> </a:t>
-            </a:r>
-            <a:r>
-              <a:rPr lang="en-US" sz="2800" dirty="0">
-                <a:latin typeface="Bodoni MT" panose="02070603080606020203" pitchFamily="18" charset="0"/>
-              </a:rPr>
-              <a:t>It can also be beneficial to insurance companies looking to change their rates in different areas. </a:t>
-            </a:r>
-          </a:p>
-          <a:p>
-            <a:pPr algn="l"/>
+            <a:pPr algn="ctr"/>
+            <a:r>
+              <a:rPr lang="en-CA" dirty="0" smtClean="0"/>
+              <a:t>IMPACT TYPE BY YEAR</a:t>
+            </a:r>
             <a:endParaRPr lang="en-CA" dirty="0"/>
           </a:p>
         </p:txBody>
       </p:sp>
       <p:sp>
         <p:nvSpPr>
-          <p:cNvPr id="4" name="Hexagon 3"/>
-          <p:cNvSpPr/>
-          <p:nvPr/>
-        </p:nvSpPr>
-        <p:spPr>
-          <a:xfrm>
-            <a:off x="1766295" y="1081668"/>
-            <a:ext cx="9011249" cy="970156"/>
-          </a:xfrm>
-          <a:prstGeom prst="hexagon">
+          <p:cNvPr id="3" name="Text Placeholder 2"/>
+          <p:cNvSpPr>
+            <a:spLocks noGrp="1"/>
+          </p:cNvSpPr>
+          <p:nvPr>
+            <p:ph type="body" idx="1"/>
+          </p:nvPr>
+        </p:nvSpPr>
+        <p:spPr>
+          <a:xfrm>
+            <a:off x="2076731" y="1414383"/>
+            <a:ext cx="3992732" cy="576262"/>
+          </a:xfrm>
+        </p:spPr>
+        <p:txBody>
+          <a:bodyPr/>
+          <a:lstStyle/>
+          <a:p>
+            <a:r>
+              <a:rPr lang="en-CA" dirty="0" smtClean="0"/>
+              <a:t>Red Light Camera</a:t>
+            </a:r>
+            <a:endParaRPr lang="en-CA" dirty="0"/>
+          </a:p>
+        </p:txBody>
+      </p:sp>
+      <p:sp>
+        <p:nvSpPr>
+          <p:cNvPr id="5" name="Text Placeholder 4"/>
+          <p:cNvSpPr>
+            <a:spLocks noGrp="1"/>
+          </p:cNvSpPr>
+          <p:nvPr>
+            <p:ph type="body" sz="quarter" idx="3"/>
+          </p:nvPr>
+        </p:nvSpPr>
+        <p:spPr>
+          <a:xfrm>
+            <a:off x="7584267" y="1438205"/>
+            <a:ext cx="3999001" cy="576262"/>
+          </a:xfrm>
+        </p:spPr>
+        <p:txBody>
+          <a:bodyPr/>
+          <a:lstStyle/>
+          <a:p>
+            <a:r>
+              <a:rPr lang="en-CA" dirty="0" smtClean="0"/>
+              <a:t>No Red Light Camera</a:t>
+            </a:r>
+            <a:endParaRPr lang="en-CA" dirty="0"/>
+          </a:p>
+        </p:txBody>
+      </p:sp>
+      <p:pic>
+        <p:nvPicPr>
+          <p:cNvPr id="10" name="Content Placeholder 9"/>
+          <p:cNvPicPr>
+            <a:picLocks noGrp="1" noChangeAspect="1"/>
+          </p:cNvPicPr>
+          <p:nvPr>
+            <p:ph sz="half" idx="2"/>
+          </p:nvPr>
+        </p:nvPicPr>
+        <p:blipFill>
+          <a:blip r:embed="rId2"/>
+          <a:stretch>
+            <a:fillRect/>
+          </a:stretch>
+        </p:blipFill>
+        <p:spPr>
+          <a:xfrm>
+            <a:off x="552449" y="2286000"/>
+            <a:ext cx="5772151" cy="4572000"/>
+          </a:xfrm>
+          <a:prstGeom prst="rect">
             <a:avLst/>
           </a:prstGeom>
-          <a:solidFill>
-            <a:schemeClr val="bg2"/>
-          </a:solidFill>
-        </p:spPr>
-        <p:style>
-          <a:lnRef idx="2">
-            <a:schemeClr val="accent1">
-              <a:shade val="50000"/>
-            </a:schemeClr>
-          </a:lnRef>
-          <a:fillRef idx="1">
-            <a:schemeClr val="accent1"/>
-          </a:fillRef>
-          <a:effectRef idx="0">
-            <a:schemeClr val="accent1"/>
-          </a:effectRef>
-          <a:fontRef idx="minor">
-            <a:schemeClr val="lt1"/>
-          </a:fontRef>
-        </p:style>
-        <p:txBody>
-          <a:bodyPr rtlCol="0" anchor="ctr"/>
-          <a:lstStyle/>
-          <a:p>
-            <a:pPr algn="ctr"/>
-            <a:endParaRPr lang="en-CA"/>
-          </a:p>
-        </p:txBody>
-      </p:sp>
-      <p:sp>
-        <p:nvSpPr>
-          <p:cNvPr id="6" name="Title 2"/>
-          <p:cNvSpPr>
-            <a:spLocks noGrp="1"/>
-          </p:cNvSpPr>
-          <p:nvPr>
-            <p:ph type="title"/>
-          </p:nvPr>
-        </p:nvSpPr>
-        <p:spPr>
-          <a:xfrm>
-            <a:off x="857993" y="1163140"/>
-            <a:ext cx="10515600" cy="807211"/>
-          </a:xfrm>
-        </p:spPr>
-        <p:txBody>
-          <a:bodyPr>
-            <a:normAutofit/>
-          </a:bodyPr>
-          <a:lstStyle/>
-          <a:p>
-            <a:pPr algn="ctr"/>
-            <a:r>
-              <a:rPr lang="en-CA" sz="3600" b="1" dirty="0" smtClean="0">
-                <a:latin typeface="Bodoni MT" panose="02070603080606020203" pitchFamily="18" charset="0"/>
-              </a:rPr>
-              <a:t>IMPORTANCE OFTHIS ANALYSIS</a:t>
-            </a:r>
-            <a:endParaRPr lang="en-CA" sz="3600" b="1" dirty="0">
-              <a:latin typeface="Bodoni MT" panose="02070603080606020203" pitchFamily="18" charset="0"/>
-            </a:endParaRPr>
-          </a:p>
-        </p:txBody>
-      </p:sp>
+          <a:noFill/>
+        </p:spPr>
+      </p:pic>
+      <p:pic>
+        <p:nvPicPr>
+          <p:cNvPr id="12" name="Content Placeholder 11"/>
+          <p:cNvPicPr>
+            <a:picLocks noGrp="1" noChangeAspect="1"/>
+          </p:cNvPicPr>
+          <p:nvPr>
+            <p:ph sz="quarter" idx="4"/>
+          </p:nvPr>
+        </p:nvPicPr>
+        <p:blipFill>
+          <a:blip r:embed="rId3"/>
+          <a:stretch>
+            <a:fillRect/>
+          </a:stretch>
+        </p:blipFill>
+        <p:spPr>
+          <a:xfrm>
+            <a:off x="6810375" y="2286000"/>
+            <a:ext cx="5286375" cy="4571999"/>
+          </a:xfrm>
+          <a:prstGeom prst="rect">
+            <a:avLst/>
+          </a:prstGeom>
+        </p:spPr>
+      </p:pic>
     </p:spTree>
     <p:extLst>
       <p:ext uri="{BB962C8B-B14F-4D97-AF65-F5344CB8AC3E}">
-        <p14:creationId xmlns:p14="http://schemas.microsoft.com/office/powerpoint/2010/main" val="4069956856"/>
+        <p14:creationId xmlns:p14="http://schemas.microsoft.com/office/powerpoint/2010/main" val="1645710913"/>
       </p:ext>
     </p:extLst>
   </p:cSld>
@@ -12253,37 +12181,1031 @@
       </p:grpSpPr>
       <p:sp>
         <p:nvSpPr>
-          <p:cNvPr id="2" name="Text Placeholder 1"/>
-          <p:cNvSpPr>
-            <a:spLocks noGrp="1"/>
-          </p:cNvSpPr>
-          <p:nvPr>
-            <p:ph type="body" sz="quarter" idx="13"/>
-          </p:nvPr>
-        </p:nvSpPr>
-        <p:spPr/>
+          <p:cNvPr id="2" name="Title 1"/>
+          <p:cNvSpPr>
+            <a:spLocks noGrp="1"/>
+          </p:cNvSpPr>
+          <p:nvPr>
+            <p:ph type="title"/>
+          </p:nvPr>
+        </p:nvSpPr>
+        <p:spPr>
+          <a:xfrm>
+            <a:off x="2592924" y="624110"/>
+            <a:ext cx="8911687" cy="618094"/>
+          </a:xfrm>
+        </p:spPr>
+        <p:txBody>
+          <a:bodyPr>
+            <a:normAutofit fontScale="90000"/>
+          </a:bodyPr>
+          <a:lstStyle/>
+          <a:p>
+            <a:pPr algn="ctr"/>
+            <a:r>
+              <a:rPr lang="en-CA" dirty="0" smtClean="0"/>
+              <a:t>IMPACT TYPE BY VISIBILITY</a:t>
+            </a:r>
+            <a:endParaRPr lang="en-CA" dirty="0"/>
+          </a:p>
+        </p:txBody>
+      </p:sp>
+      <p:sp>
+        <p:nvSpPr>
+          <p:cNvPr id="3" name="Text Placeholder 2"/>
+          <p:cNvSpPr>
+            <a:spLocks noGrp="1"/>
+          </p:cNvSpPr>
+          <p:nvPr>
+            <p:ph type="body" idx="1"/>
+          </p:nvPr>
+        </p:nvSpPr>
+        <p:spPr>
+          <a:xfrm>
+            <a:off x="1723049" y="1337613"/>
+            <a:ext cx="3992732" cy="576262"/>
+          </a:xfrm>
+        </p:spPr>
+        <p:txBody>
+          <a:bodyPr/>
+          <a:lstStyle/>
+          <a:p>
+            <a:r>
+              <a:rPr lang="en-CA" dirty="0" smtClean="0"/>
+              <a:t>Red Light Camera</a:t>
+            </a:r>
+            <a:endParaRPr lang="en-CA" dirty="0"/>
+          </a:p>
+        </p:txBody>
+      </p:sp>
+      <p:sp>
+        <p:nvSpPr>
+          <p:cNvPr id="5" name="Text Placeholder 4"/>
+          <p:cNvSpPr>
+            <a:spLocks noGrp="1"/>
+          </p:cNvSpPr>
+          <p:nvPr>
+            <p:ph type="body" sz="quarter" idx="3"/>
+          </p:nvPr>
+        </p:nvSpPr>
+        <p:spPr>
+          <a:xfrm>
+            <a:off x="7575640" y="1394655"/>
+            <a:ext cx="3999001" cy="576262"/>
+          </a:xfrm>
+        </p:spPr>
+        <p:txBody>
+          <a:bodyPr/>
+          <a:lstStyle/>
+          <a:p>
+            <a:r>
+              <a:rPr lang="en-CA" dirty="0" smtClean="0"/>
+              <a:t>No Red Light Camera</a:t>
+            </a:r>
+            <a:endParaRPr lang="en-CA" dirty="0"/>
+          </a:p>
+        </p:txBody>
+      </p:sp>
+      <p:pic>
+        <p:nvPicPr>
+          <p:cNvPr id="10" name="Content Placeholder 9"/>
+          <p:cNvPicPr>
+            <a:picLocks noGrp="1" noChangeAspect="1"/>
+          </p:cNvPicPr>
+          <p:nvPr>
+            <p:ph sz="half" idx="2"/>
+          </p:nvPr>
+        </p:nvPicPr>
+        <p:blipFill>
+          <a:blip r:embed="rId2"/>
+          <a:stretch>
+            <a:fillRect/>
+          </a:stretch>
+        </p:blipFill>
+        <p:spPr>
+          <a:xfrm>
+            <a:off x="400050" y="2028824"/>
+            <a:ext cx="5600700" cy="4829175"/>
+          </a:xfrm>
+          <a:prstGeom prst="rect">
+            <a:avLst/>
+          </a:prstGeom>
+        </p:spPr>
+      </p:pic>
+      <p:pic>
+        <p:nvPicPr>
+          <p:cNvPr id="12" name="Content Placeholder 11"/>
+          <p:cNvPicPr>
+            <a:picLocks noGrp="1" noChangeAspect="1"/>
+          </p:cNvPicPr>
+          <p:nvPr>
+            <p:ph sz="quarter" idx="4"/>
+          </p:nvPr>
+        </p:nvPicPr>
+        <p:blipFill>
+          <a:blip r:embed="rId3"/>
+          <a:stretch>
+            <a:fillRect/>
+          </a:stretch>
+        </p:blipFill>
+        <p:spPr>
+          <a:xfrm>
+            <a:off x="6705600" y="2028825"/>
+            <a:ext cx="5486399" cy="4829174"/>
+          </a:xfrm>
+          <a:prstGeom prst="rect">
+            <a:avLst/>
+          </a:prstGeom>
+        </p:spPr>
+      </p:pic>
+    </p:spTree>
+    <p:extLst>
+      <p:ext uri="{BB962C8B-B14F-4D97-AF65-F5344CB8AC3E}">
+        <p14:creationId xmlns:p14="http://schemas.microsoft.com/office/powerpoint/2010/main" val="2868233166"/>
+      </p:ext>
+    </p:extLst>
+  </p:cSld>
+  <p:clrMapOvr>
+    <a:masterClrMapping/>
+  </p:clrMapOvr>
+  <p:timing>
+    <p:tnLst>
+      <p:par>
+        <p:cTn id="1" dur="indefinite" restart="never" nodeType="tmRoot"/>
+      </p:par>
+    </p:tnLst>
+  </p:timing>
+</p:sld>
+</file>
+
+<file path=ppt/slides/slide15.xml><?xml version="1.0" encoding="utf-8"?>
+<p:sld xmlns:a="http://schemas.openxmlformats.org/drawingml/2006/main" xmlns:r="http://schemas.openxmlformats.org/officeDocument/2006/relationships" xmlns:p="http://schemas.openxmlformats.org/presentationml/2006/main">
+  <p:cSld>
+    <p:spTree>
+      <p:nvGrpSpPr>
+        <p:cNvPr id="1" name=""/>
+        <p:cNvGrpSpPr/>
+        <p:nvPr/>
+      </p:nvGrpSpPr>
+      <p:grpSpPr>
+        <a:xfrm>
+          <a:off x="0" y="0"/>
+          <a:ext cx="0" cy="0"/>
+          <a:chOff x="0" y="0"/>
+          <a:chExt cx="0" cy="0"/>
+        </a:xfrm>
+      </p:grpSpPr>
+      <p:sp>
+        <p:nvSpPr>
+          <p:cNvPr id="2" name="Title 1"/>
+          <p:cNvSpPr>
+            <a:spLocks noGrp="1"/>
+          </p:cNvSpPr>
+          <p:nvPr>
+            <p:ph type="title"/>
+          </p:nvPr>
+        </p:nvSpPr>
+        <p:spPr>
+          <a:xfrm>
+            <a:off x="2592924" y="624110"/>
+            <a:ext cx="8911687" cy="592215"/>
+          </a:xfrm>
+        </p:spPr>
         <p:txBody>
           <a:bodyPr>
             <a:normAutofit/>
           </a:bodyPr>
           <a:lstStyle/>
           <a:p>
-            <a:r>
-              <a:rPr lang="en-CA" sz="3600" dirty="0" smtClean="0">
-                <a:latin typeface="Bodoni MT" panose="02070603080606020203" pitchFamily="18" charset="0"/>
-              </a:rPr>
-              <a:t>To be Continued……</a:t>
-            </a:r>
-            <a:endParaRPr lang="en-CA" sz="3600" dirty="0">
-              <a:latin typeface="Bodoni MT" panose="02070603080606020203" pitchFamily="18" charset="0"/>
-            </a:endParaRPr>
-          </a:p>
-        </p:txBody>
-      </p:sp>
+            <a:pPr algn="ctr"/>
+            <a:r>
+              <a:rPr lang="en-CA" sz="3200" dirty="0" smtClean="0"/>
+              <a:t>IMPACT TYPE BY SEVERITY</a:t>
+            </a:r>
+            <a:endParaRPr lang="en-CA" sz="3200" dirty="0"/>
+          </a:p>
+        </p:txBody>
+      </p:sp>
+      <p:sp>
+        <p:nvSpPr>
+          <p:cNvPr id="3" name="Text Placeholder 2"/>
+          <p:cNvSpPr>
+            <a:spLocks noGrp="1"/>
+          </p:cNvSpPr>
+          <p:nvPr>
+            <p:ph type="body" idx="1"/>
+          </p:nvPr>
+        </p:nvSpPr>
+        <p:spPr>
+          <a:xfrm>
+            <a:off x="1999094" y="1393213"/>
+            <a:ext cx="3992732" cy="576262"/>
+          </a:xfrm>
+        </p:spPr>
+        <p:txBody>
+          <a:bodyPr/>
+          <a:lstStyle/>
+          <a:p>
+            <a:r>
+              <a:rPr lang="en-CA" dirty="0" smtClean="0"/>
+              <a:t>Red Light Camera</a:t>
+            </a:r>
+            <a:endParaRPr lang="en-CA" dirty="0"/>
+          </a:p>
+        </p:txBody>
+      </p:sp>
+      <p:sp>
+        <p:nvSpPr>
+          <p:cNvPr id="5" name="Text Placeholder 4"/>
+          <p:cNvSpPr>
+            <a:spLocks noGrp="1"/>
+          </p:cNvSpPr>
+          <p:nvPr>
+            <p:ph type="body" sz="quarter" idx="3"/>
+          </p:nvPr>
+        </p:nvSpPr>
+        <p:spPr>
+          <a:xfrm>
+            <a:off x="7653278" y="1417466"/>
+            <a:ext cx="3999001" cy="576262"/>
+          </a:xfrm>
+        </p:spPr>
+        <p:txBody>
+          <a:bodyPr/>
+          <a:lstStyle/>
+          <a:p>
+            <a:r>
+              <a:rPr lang="en-CA" dirty="0" smtClean="0"/>
+              <a:t>No Red Light Camera</a:t>
+            </a:r>
+            <a:endParaRPr lang="en-CA" dirty="0"/>
+          </a:p>
+        </p:txBody>
+      </p:sp>
+      <p:pic>
+        <p:nvPicPr>
+          <p:cNvPr id="8" name="Content Placeholder 7"/>
+          <p:cNvPicPr>
+            <a:picLocks noGrp="1" noChangeAspect="1"/>
+          </p:cNvPicPr>
+          <p:nvPr>
+            <p:ph sz="quarter" idx="4"/>
+          </p:nvPr>
+        </p:nvPicPr>
+        <p:blipFill>
+          <a:blip r:embed="rId2"/>
+          <a:stretch>
+            <a:fillRect/>
+          </a:stretch>
+        </p:blipFill>
+        <p:spPr>
+          <a:xfrm>
+            <a:off x="6487064" y="2261806"/>
+            <a:ext cx="5451894" cy="4596194"/>
+          </a:xfrm>
+          <a:prstGeom prst="rect">
+            <a:avLst/>
+          </a:prstGeom>
+        </p:spPr>
+      </p:pic>
+      <p:pic>
+        <p:nvPicPr>
+          <p:cNvPr id="10" name="Content Placeholder 9"/>
+          <p:cNvPicPr>
+            <a:picLocks noGrp="1" noChangeAspect="1"/>
+          </p:cNvPicPr>
+          <p:nvPr>
+            <p:ph sz="half" idx="2"/>
+          </p:nvPr>
+        </p:nvPicPr>
+        <p:blipFill>
+          <a:blip r:embed="rId3"/>
+          <a:stretch>
+            <a:fillRect/>
+          </a:stretch>
+        </p:blipFill>
+        <p:spPr>
+          <a:xfrm>
+            <a:off x="619125" y="2146363"/>
+            <a:ext cx="5448300" cy="4711637"/>
+          </a:xfrm>
+          <a:prstGeom prst="rect">
+            <a:avLst/>
+          </a:prstGeom>
+        </p:spPr>
+      </p:pic>
     </p:spTree>
     <p:extLst>
       <p:ext uri="{BB962C8B-B14F-4D97-AF65-F5344CB8AC3E}">
-        <p14:creationId xmlns:p14="http://schemas.microsoft.com/office/powerpoint/2010/main" val="426935185"/>
+        <p14:creationId xmlns:p14="http://schemas.microsoft.com/office/powerpoint/2010/main" val="2958294476"/>
+      </p:ext>
+    </p:extLst>
+  </p:cSld>
+  <p:clrMapOvr>
+    <a:masterClrMapping/>
+  </p:clrMapOvr>
+  <p:timing>
+    <p:tnLst>
+      <p:par>
+        <p:cTn id="1" dur="indefinite" restart="never" nodeType="tmRoot"/>
+      </p:par>
+    </p:tnLst>
+  </p:timing>
+</p:sld>
+</file>
+
+<file path=ppt/slides/slide16.xml><?xml version="1.0" encoding="utf-8"?>
+<p:sld xmlns:a="http://schemas.openxmlformats.org/drawingml/2006/main" xmlns:r="http://schemas.openxmlformats.org/officeDocument/2006/relationships" xmlns:p="http://schemas.openxmlformats.org/presentationml/2006/main">
+  <p:cSld>
+    <p:spTree>
+      <p:nvGrpSpPr>
+        <p:cNvPr id="1" name=""/>
+        <p:cNvGrpSpPr/>
+        <p:nvPr/>
+      </p:nvGrpSpPr>
+      <p:grpSpPr>
+        <a:xfrm>
+          <a:off x="0" y="0"/>
+          <a:ext cx="0" cy="0"/>
+          <a:chOff x="0" y="0"/>
+          <a:chExt cx="0" cy="0"/>
+        </a:xfrm>
+      </p:grpSpPr>
+      <p:sp>
+        <p:nvSpPr>
+          <p:cNvPr id="2" name="Title 1"/>
+          <p:cNvSpPr>
+            <a:spLocks noGrp="1"/>
+          </p:cNvSpPr>
+          <p:nvPr>
+            <p:ph type="title"/>
+          </p:nvPr>
+        </p:nvSpPr>
+        <p:spPr>
+          <a:xfrm>
+            <a:off x="1854680" y="624110"/>
+            <a:ext cx="9649932" cy="652599"/>
+          </a:xfrm>
+        </p:spPr>
+        <p:txBody>
+          <a:bodyPr/>
+          <a:lstStyle/>
+          <a:p>
+            <a:pPr algn="ctr"/>
+            <a:r>
+              <a:rPr lang="en-CA" dirty="0" smtClean="0"/>
+              <a:t>COLLISIONS BY DAY OF WEEK</a:t>
+            </a:r>
+            <a:endParaRPr lang="en-CA" dirty="0"/>
+          </a:p>
+        </p:txBody>
+      </p:sp>
+      <p:sp>
+        <p:nvSpPr>
+          <p:cNvPr id="3" name="Text Placeholder 2"/>
+          <p:cNvSpPr>
+            <a:spLocks noGrp="1"/>
+          </p:cNvSpPr>
+          <p:nvPr>
+            <p:ph type="body" idx="1"/>
+          </p:nvPr>
+        </p:nvSpPr>
+        <p:spPr>
+          <a:xfrm>
+            <a:off x="1645410" y="1393213"/>
+            <a:ext cx="3992732" cy="576262"/>
+          </a:xfrm>
+        </p:spPr>
+        <p:txBody>
+          <a:bodyPr/>
+          <a:lstStyle/>
+          <a:p>
+            <a:r>
+              <a:rPr lang="en-CA" dirty="0" smtClean="0"/>
+              <a:t>RED LIGHT CAMERA</a:t>
+            </a:r>
+            <a:endParaRPr lang="en-CA" dirty="0"/>
+          </a:p>
+        </p:txBody>
+      </p:sp>
+      <p:pic>
+        <p:nvPicPr>
+          <p:cNvPr id="7" name="Content Placeholder 6"/>
+          <p:cNvPicPr>
+            <a:picLocks noGrp="1" noChangeAspect="1"/>
+          </p:cNvPicPr>
+          <p:nvPr>
+            <p:ph sz="half" idx="2"/>
+          </p:nvPr>
+        </p:nvPicPr>
+        <p:blipFill>
+          <a:blip r:embed="rId2"/>
+          <a:stretch>
+            <a:fillRect/>
+          </a:stretch>
+        </p:blipFill>
+        <p:spPr>
+          <a:xfrm>
+            <a:off x="854015" y="2457576"/>
+            <a:ext cx="5134795" cy="4400424"/>
+          </a:xfrm>
+          <a:prstGeom prst="rect">
+            <a:avLst/>
+          </a:prstGeom>
+        </p:spPr>
+      </p:pic>
+      <p:sp>
+        <p:nvSpPr>
+          <p:cNvPr id="5" name="Text Placeholder 4"/>
+          <p:cNvSpPr>
+            <a:spLocks noGrp="1"/>
+          </p:cNvSpPr>
+          <p:nvPr>
+            <p:ph type="body" sz="quarter" idx="3"/>
+          </p:nvPr>
+        </p:nvSpPr>
+        <p:spPr>
+          <a:xfrm>
+            <a:off x="7337380" y="1393213"/>
+            <a:ext cx="3999001" cy="576262"/>
+          </a:xfrm>
+        </p:spPr>
+        <p:txBody>
+          <a:bodyPr/>
+          <a:lstStyle/>
+          <a:p>
+            <a:r>
+              <a:rPr lang="en-CA" dirty="0" smtClean="0"/>
+              <a:t>NO RED LIGHT CAMERA</a:t>
+            </a:r>
+            <a:endParaRPr lang="en-CA" dirty="0"/>
+          </a:p>
+        </p:txBody>
+      </p:sp>
+      <p:pic>
+        <p:nvPicPr>
+          <p:cNvPr id="8" name="Content Placeholder 7"/>
+          <p:cNvPicPr>
+            <a:picLocks noGrp="1" noChangeAspect="1"/>
+          </p:cNvPicPr>
+          <p:nvPr>
+            <p:ph sz="quarter" idx="4"/>
+          </p:nvPr>
+        </p:nvPicPr>
+        <p:blipFill>
+          <a:blip r:embed="rId3"/>
+          <a:stretch>
+            <a:fillRect/>
+          </a:stretch>
+        </p:blipFill>
+        <p:spPr>
+          <a:xfrm>
+            <a:off x="6426679" y="2457576"/>
+            <a:ext cx="5633049" cy="4400424"/>
+          </a:xfrm>
+          <a:prstGeom prst="rect">
+            <a:avLst/>
+          </a:prstGeom>
+        </p:spPr>
+      </p:pic>
+    </p:spTree>
+    <p:extLst>
+      <p:ext uri="{BB962C8B-B14F-4D97-AF65-F5344CB8AC3E}">
+        <p14:creationId xmlns:p14="http://schemas.microsoft.com/office/powerpoint/2010/main" val="269041912"/>
+      </p:ext>
+    </p:extLst>
+  </p:cSld>
+  <p:clrMapOvr>
+    <a:masterClrMapping/>
+  </p:clrMapOvr>
+  <p:timing>
+    <p:tnLst>
+      <p:par>
+        <p:cTn id="1" dur="indefinite" restart="never" nodeType="tmRoot"/>
+      </p:par>
+    </p:tnLst>
+  </p:timing>
+</p:sld>
+</file>
+
+<file path=ppt/slides/slide17.xml><?xml version="1.0" encoding="utf-8"?>
+<p:sld xmlns:a="http://schemas.openxmlformats.org/drawingml/2006/main" xmlns:r="http://schemas.openxmlformats.org/officeDocument/2006/relationships" xmlns:p="http://schemas.openxmlformats.org/presentationml/2006/main">
+  <p:cSld>
+    <p:spTree>
+      <p:nvGrpSpPr>
+        <p:cNvPr id="1" name=""/>
+        <p:cNvGrpSpPr/>
+        <p:nvPr/>
+      </p:nvGrpSpPr>
+      <p:grpSpPr>
+        <a:xfrm>
+          <a:off x="0" y="0"/>
+          <a:ext cx="0" cy="0"/>
+          <a:chOff x="0" y="0"/>
+          <a:chExt cx="0" cy="0"/>
+        </a:xfrm>
+      </p:grpSpPr>
+      <p:sp>
+        <p:nvSpPr>
+          <p:cNvPr id="2" name="Title 1"/>
+          <p:cNvSpPr>
+            <a:spLocks noGrp="1"/>
+          </p:cNvSpPr>
+          <p:nvPr>
+            <p:ph type="title"/>
+          </p:nvPr>
+        </p:nvSpPr>
+        <p:spPr>
+          <a:xfrm>
+            <a:off x="1647646" y="624110"/>
+            <a:ext cx="9856966" cy="1280890"/>
+          </a:xfrm>
+        </p:spPr>
+        <p:txBody>
+          <a:bodyPr>
+            <a:normAutofit/>
+          </a:bodyPr>
+          <a:lstStyle/>
+          <a:p>
+            <a:pPr algn="ctr"/>
+            <a:r>
+              <a:rPr lang="en-CA" sz="2800" dirty="0" smtClean="0"/>
+              <a:t>Heat Map Total Accidents by Week of Each Month</a:t>
+            </a:r>
+            <a:br>
+              <a:rPr lang="en-CA" sz="2800" dirty="0" smtClean="0"/>
+            </a:br>
+            <a:r>
+              <a:rPr lang="en-CA" sz="2800" dirty="0" smtClean="0"/>
+              <a:t>2006-2020</a:t>
+            </a:r>
+            <a:endParaRPr lang="en-CA" sz="2800" dirty="0"/>
+          </a:p>
+        </p:txBody>
+      </p:sp>
+      <p:sp>
+        <p:nvSpPr>
+          <p:cNvPr id="3" name="Text Placeholder 2"/>
+          <p:cNvSpPr>
+            <a:spLocks noGrp="1"/>
+          </p:cNvSpPr>
+          <p:nvPr>
+            <p:ph type="body" idx="1"/>
+          </p:nvPr>
+        </p:nvSpPr>
+        <p:spPr>
+          <a:xfrm>
+            <a:off x="1647645" y="1616869"/>
+            <a:ext cx="3992732" cy="576262"/>
+          </a:xfrm>
+        </p:spPr>
+        <p:txBody>
+          <a:bodyPr/>
+          <a:lstStyle/>
+          <a:p>
+            <a:r>
+              <a:rPr lang="en-CA" dirty="0" smtClean="0"/>
+              <a:t>Red Light Camera</a:t>
+            </a:r>
+            <a:endParaRPr lang="en-CA" dirty="0"/>
+          </a:p>
+        </p:txBody>
+      </p:sp>
+      <p:pic>
+        <p:nvPicPr>
+          <p:cNvPr id="7" name="Content Placeholder 6"/>
+          <p:cNvPicPr>
+            <a:picLocks noGrp="1" noChangeAspect="1"/>
+          </p:cNvPicPr>
+          <p:nvPr>
+            <p:ph sz="half" idx="2"/>
+          </p:nvPr>
+        </p:nvPicPr>
+        <p:blipFill>
+          <a:blip r:embed="rId2"/>
+          <a:stretch>
+            <a:fillRect/>
+          </a:stretch>
+        </p:blipFill>
+        <p:spPr>
+          <a:xfrm>
+            <a:off x="867979" y="2325238"/>
+            <a:ext cx="5092874" cy="4532762"/>
+          </a:xfrm>
+          <a:prstGeom prst="rect">
+            <a:avLst/>
+          </a:prstGeom>
+        </p:spPr>
+      </p:pic>
+      <p:sp>
+        <p:nvSpPr>
+          <p:cNvPr id="5" name="Text Placeholder 4"/>
+          <p:cNvSpPr>
+            <a:spLocks noGrp="1"/>
+          </p:cNvSpPr>
+          <p:nvPr>
+            <p:ph type="body" sz="quarter" idx="3"/>
+          </p:nvPr>
+        </p:nvSpPr>
+        <p:spPr>
+          <a:xfrm>
+            <a:off x="7411917" y="1616869"/>
+            <a:ext cx="3999001" cy="576262"/>
+          </a:xfrm>
+        </p:spPr>
+        <p:txBody>
+          <a:bodyPr/>
+          <a:lstStyle/>
+          <a:p>
+            <a:r>
+              <a:rPr lang="en-CA" dirty="0" smtClean="0"/>
+              <a:t>No Red Light Camera</a:t>
+            </a:r>
+            <a:endParaRPr lang="en-CA" dirty="0"/>
+          </a:p>
+        </p:txBody>
+      </p:sp>
+      <p:pic>
+        <p:nvPicPr>
+          <p:cNvPr id="8" name="Content Placeholder 7"/>
+          <p:cNvPicPr>
+            <a:picLocks noGrp="1" noChangeAspect="1"/>
+          </p:cNvPicPr>
+          <p:nvPr>
+            <p:ph sz="quarter" idx="4"/>
+          </p:nvPr>
+        </p:nvPicPr>
+        <p:blipFill>
+          <a:blip r:embed="rId3"/>
+          <a:stretch>
+            <a:fillRect/>
+          </a:stretch>
+        </p:blipFill>
+        <p:spPr>
+          <a:xfrm>
+            <a:off x="6576129" y="2325238"/>
+            <a:ext cx="5469147" cy="4532762"/>
+          </a:xfrm>
+          <a:prstGeom prst="rect">
+            <a:avLst/>
+          </a:prstGeom>
+        </p:spPr>
+      </p:pic>
+    </p:spTree>
+    <p:extLst>
+      <p:ext uri="{BB962C8B-B14F-4D97-AF65-F5344CB8AC3E}">
+        <p14:creationId xmlns:p14="http://schemas.microsoft.com/office/powerpoint/2010/main" val="854521625"/>
+      </p:ext>
+    </p:extLst>
+  </p:cSld>
+  <p:clrMapOvr>
+    <a:masterClrMapping/>
+  </p:clrMapOvr>
+  <p:timing>
+    <p:tnLst>
+      <p:par>
+        <p:cTn id="1" dur="indefinite" restart="never" nodeType="tmRoot"/>
+      </p:par>
+    </p:tnLst>
+  </p:timing>
+</p:sld>
+</file>
+
+<file path=ppt/slides/slide18.xml><?xml version="1.0" encoding="utf-8"?>
+<p:sld xmlns:a="http://schemas.openxmlformats.org/drawingml/2006/main" xmlns:r="http://schemas.openxmlformats.org/officeDocument/2006/relationships" xmlns:p="http://schemas.openxmlformats.org/presentationml/2006/main">
+  <p:cSld>
+    <p:spTree>
+      <p:nvGrpSpPr>
+        <p:cNvPr id="1" name=""/>
+        <p:cNvGrpSpPr/>
+        <p:nvPr/>
+      </p:nvGrpSpPr>
+      <p:grpSpPr>
+        <a:xfrm>
+          <a:off x="0" y="0"/>
+          <a:ext cx="0" cy="0"/>
+          <a:chOff x="0" y="0"/>
+          <a:chExt cx="0" cy="0"/>
+        </a:xfrm>
+      </p:grpSpPr>
+      <p:sp>
+        <p:nvSpPr>
+          <p:cNvPr id="2" name="Title 1"/>
+          <p:cNvSpPr>
+            <a:spLocks noGrp="1"/>
+          </p:cNvSpPr>
+          <p:nvPr>
+            <p:ph type="title"/>
+          </p:nvPr>
+        </p:nvSpPr>
+        <p:spPr>
+          <a:xfrm>
+            <a:off x="1699404" y="624110"/>
+            <a:ext cx="9805207" cy="600841"/>
+          </a:xfrm>
+        </p:spPr>
+        <p:txBody>
+          <a:bodyPr>
+            <a:normAutofit/>
+          </a:bodyPr>
+          <a:lstStyle/>
+          <a:p>
+            <a:pPr algn="ctr"/>
+            <a:r>
+              <a:rPr lang="en-CA" sz="3200" dirty="0" smtClean="0"/>
+              <a:t>COLLISION BY DAY OF WEEK AND TIME OF DAY</a:t>
+            </a:r>
+            <a:endParaRPr lang="en-CA" sz="3200" dirty="0"/>
+          </a:p>
+        </p:txBody>
+      </p:sp>
+      <p:sp>
+        <p:nvSpPr>
+          <p:cNvPr id="3" name="Text Placeholder 2"/>
+          <p:cNvSpPr>
+            <a:spLocks noGrp="1"/>
+          </p:cNvSpPr>
+          <p:nvPr>
+            <p:ph type="body" idx="1"/>
+          </p:nvPr>
+        </p:nvSpPr>
+        <p:spPr>
+          <a:xfrm>
+            <a:off x="1699404" y="1443119"/>
+            <a:ext cx="3992732" cy="576262"/>
+          </a:xfrm>
+        </p:spPr>
+        <p:txBody>
+          <a:bodyPr/>
+          <a:lstStyle/>
+          <a:p>
+            <a:r>
+              <a:rPr lang="en-CA" dirty="0" smtClean="0"/>
+              <a:t>Red Light Camera</a:t>
+            </a:r>
+            <a:endParaRPr lang="en-CA" dirty="0"/>
+          </a:p>
+        </p:txBody>
+      </p:sp>
+      <p:sp>
+        <p:nvSpPr>
+          <p:cNvPr id="5" name="Text Placeholder 4"/>
+          <p:cNvSpPr>
+            <a:spLocks noGrp="1"/>
+          </p:cNvSpPr>
+          <p:nvPr>
+            <p:ph type="body" sz="quarter" idx="3"/>
+          </p:nvPr>
+        </p:nvSpPr>
+        <p:spPr>
+          <a:xfrm>
+            <a:off x="7567014" y="1443119"/>
+            <a:ext cx="3999001" cy="576262"/>
+          </a:xfrm>
+        </p:spPr>
+        <p:txBody>
+          <a:bodyPr/>
+          <a:lstStyle/>
+          <a:p>
+            <a:r>
+              <a:rPr lang="en-CA" dirty="0" smtClean="0"/>
+              <a:t>No Red Light Camera</a:t>
+            </a:r>
+            <a:endParaRPr lang="en-CA" dirty="0"/>
+          </a:p>
+        </p:txBody>
+      </p:sp>
+      <p:pic>
+        <p:nvPicPr>
+          <p:cNvPr id="10" name="Content Placeholder 9"/>
+          <p:cNvPicPr>
+            <a:picLocks noGrp="1" noChangeAspect="1"/>
+          </p:cNvPicPr>
+          <p:nvPr>
+            <p:ph sz="half" idx="2"/>
+          </p:nvPr>
+        </p:nvPicPr>
+        <p:blipFill>
+          <a:blip r:embed="rId2"/>
+          <a:stretch>
+            <a:fillRect/>
+          </a:stretch>
+        </p:blipFill>
+        <p:spPr>
+          <a:xfrm>
+            <a:off x="569343" y="2237549"/>
+            <a:ext cx="5365631" cy="4620451"/>
+          </a:xfrm>
+          <a:prstGeom prst="rect">
+            <a:avLst/>
+          </a:prstGeom>
+        </p:spPr>
+      </p:pic>
+      <p:pic>
+        <p:nvPicPr>
+          <p:cNvPr id="12" name="Content Placeholder 11"/>
+          <p:cNvPicPr>
+            <a:picLocks noGrp="1" noChangeAspect="1"/>
+          </p:cNvPicPr>
+          <p:nvPr>
+            <p:ph sz="quarter" idx="4"/>
+          </p:nvPr>
+        </p:nvPicPr>
+        <p:blipFill>
+          <a:blip r:embed="rId3"/>
+          <a:stretch>
+            <a:fillRect/>
+          </a:stretch>
+        </p:blipFill>
+        <p:spPr>
+          <a:xfrm>
+            <a:off x="6383548" y="2237549"/>
+            <a:ext cx="5469146" cy="4620451"/>
+          </a:xfrm>
+          <a:prstGeom prst="rect">
+            <a:avLst/>
+          </a:prstGeom>
+        </p:spPr>
+      </p:pic>
+    </p:spTree>
+    <p:extLst>
+      <p:ext uri="{BB962C8B-B14F-4D97-AF65-F5344CB8AC3E}">
+        <p14:creationId xmlns:p14="http://schemas.microsoft.com/office/powerpoint/2010/main" val="2855817969"/>
+      </p:ext>
+    </p:extLst>
+  </p:cSld>
+  <p:clrMapOvr>
+    <a:masterClrMapping/>
+  </p:clrMapOvr>
+  <p:timing>
+    <p:tnLst>
+      <p:par>
+        <p:cTn id="1" dur="indefinite" restart="never" nodeType="tmRoot"/>
+      </p:par>
+    </p:tnLst>
+  </p:timing>
+</p:sld>
+</file>
+
+<file path=ppt/slides/slide19.xml><?xml version="1.0" encoding="utf-8"?>
+<p:sld xmlns:a="http://schemas.openxmlformats.org/drawingml/2006/main" xmlns:r="http://schemas.openxmlformats.org/officeDocument/2006/relationships" xmlns:p="http://schemas.openxmlformats.org/presentationml/2006/main">
+  <p:cSld>
+    <p:spTree>
+      <p:nvGrpSpPr>
+        <p:cNvPr id="1" name=""/>
+        <p:cNvGrpSpPr/>
+        <p:nvPr/>
+      </p:nvGrpSpPr>
+      <p:grpSpPr>
+        <a:xfrm>
+          <a:off x="0" y="0"/>
+          <a:ext cx="0" cy="0"/>
+          <a:chOff x="0" y="0"/>
+          <a:chExt cx="0" cy="0"/>
+        </a:xfrm>
+      </p:grpSpPr>
+      <p:sp>
+        <p:nvSpPr>
+          <p:cNvPr id="2" name="Title 1"/>
+          <p:cNvSpPr>
+            <a:spLocks noGrp="1"/>
+          </p:cNvSpPr>
+          <p:nvPr>
+            <p:ph type="title"/>
+          </p:nvPr>
+        </p:nvSpPr>
+        <p:spPr>
+          <a:xfrm>
+            <a:off x="1673526" y="624110"/>
+            <a:ext cx="10455214" cy="687105"/>
+          </a:xfrm>
+        </p:spPr>
+        <p:txBody>
+          <a:bodyPr>
+            <a:normAutofit/>
+          </a:bodyPr>
+          <a:lstStyle/>
+          <a:p>
+            <a:r>
+              <a:rPr lang="en-CA" sz="3200" dirty="0" smtClean="0"/>
+              <a:t>FATAL COLLISIONS BY DAY OF WEEK &amp; TIME OF DAY</a:t>
+            </a:r>
+            <a:endParaRPr lang="en-CA" sz="3200" dirty="0"/>
+          </a:p>
+        </p:txBody>
+      </p:sp>
+      <p:sp>
+        <p:nvSpPr>
+          <p:cNvPr id="3" name="Text Placeholder 2"/>
+          <p:cNvSpPr>
+            <a:spLocks noGrp="1"/>
+          </p:cNvSpPr>
+          <p:nvPr>
+            <p:ph type="body" idx="1"/>
+          </p:nvPr>
+        </p:nvSpPr>
+        <p:spPr>
+          <a:xfrm>
+            <a:off x="1826565" y="1354866"/>
+            <a:ext cx="3992732" cy="576262"/>
+          </a:xfrm>
+        </p:spPr>
+        <p:txBody>
+          <a:bodyPr/>
+          <a:lstStyle/>
+          <a:p>
+            <a:r>
+              <a:rPr lang="en-CA" dirty="0" smtClean="0"/>
+              <a:t>Red Light Camera</a:t>
+            </a:r>
+            <a:endParaRPr lang="en-CA" dirty="0"/>
+          </a:p>
+        </p:txBody>
+      </p:sp>
+      <p:sp>
+        <p:nvSpPr>
+          <p:cNvPr id="5" name="Text Placeholder 4"/>
+          <p:cNvSpPr>
+            <a:spLocks noGrp="1"/>
+          </p:cNvSpPr>
+          <p:nvPr>
+            <p:ph type="body" sz="quarter" idx="3"/>
+          </p:nvPr>
+        </p:nvSpPr>
+        <p:spPr>
+          <a:xfrm>
+            <a:off x="7507199" y="1496279"/>
+            <a:ext cx="3999001" cy="576262"/>
+          </a:xfrm>
+        </p:spPr>
+        <p:txBody>
+          <a:bodyPr/>
+          <a:lstStyle/>
+          <a:p>
+            <a:r>
+              <a:rPr lang="en-CA" dirty="0" smtClean="0"/>
+              <a:t>No Red Light Camera</a:t>
+            </a:r>
+            <a:endParaRPr lang="en-CA" dirty="0"/>
+          </a:p>
+        </p:txBody>
+      </p:sp>
+      <p:pic>
+        <p:nvPicPr>
+          <p:cNvPr id="10" name="Content Placeholder 9"/>
+          <p:cNvPicPr>
+            <a:picLocks noGrp="1" noChangeAspect="1"/>
+          </p:cNvPicPr>
+          <p:nvPr>
+            <p:ph sz="half" idx="2"/>
+          </p:nvPr>
+        </p:nvPicPr>
+        <p:blipFill>
+          <a:blip r:embed="rId2"/>
+          <a:stretch>
+            <a:fillRect/>
+          </a:stretch>
+        </p:blipFill>
+        <p:spPr>
+          <a:xfrm>
+            <a:off x="405442" y="2257606"/>
+            <a:ext cx="5413855" cy="4600394"/>
+          </a:xfrm>
+          <a:prstGeom prst="rect">
+            <a:avLst/>
+          </a:prstGeom>
+        </p:spPr>
+      </p:pic>
+      <p:pic>
+        <p:nvPicPr>
+          <p:cNvPr id="12" name="Content Placeholder 11"/>
+          <p:cNvPicPr>
+            <a:picLocks noGrp="1" noChangeAspect="1"/>
+          </p:cNvPicPr>
+          <p:nvPr>
+            <p:ph sz="quarter" idx="4"/>
+          </p:nvPr>
+        </p:nvPicPr>
+        <p:blipFill>
+          <a:blip r:embed="rId3"/>
+          <a:stretch>
+            <a:fillRect/>
+          </a:stretch>
+        </p:blipFill>
+        <p:spPr>
+          <a:xfrm>
+            <a:off x="6331789" y="2257605"/>
+            <a:ext cx="5546785" cy="4600395"/>
+          </a:xfrm>
+          <a:prstGeom prst="rect">
+            <a:avLst/>
+          </a:prstGeom>
+        </p:spPr>
+      </p:pic>
+    </p:spTree>
+    <p:extLst>
+      <p:ext uri="{BB962C8B-B14F-4D97-AF65-F5344CB8AC3E}">
+        <p14:creationId xmlns:p14="http://schemas.microsoft.com/office/powerpoint/2010/main" val="2041889460"/>
       </p:ext>
     </p:extLst>
   </p:cSld>
@@ -12490,6 +13412,436 @@
 </p:sld>
 </file>
 
+<file path=ppt/slides/slide20.xml><?xml version="1.0" encoding="utf-8"?>
+<p:sld xmlns:a="http://schemas.openxmlformats.org/drawingml/2006/main" xmlns:r="http://schemas.openxmlformats.org/officeDocument/2006/relationships" xmlns:p="http://schemas.openxmlformats.org/presentationml/2006/main">
+  <p:cSld>
+    <p:spTree>
+      <p:nvGrpSpPr>
+        <p:cNvPr id="1" name=""/>
+        <p:cNvGrpSpPr/>
+        <p:nvPr/>
+      </p:nvGrpSpPr>
+      <p:grpSpPr>
+        <a:xfrm>
+          <a:off x="0" y="0"/>
+          <a:ext cx="0" cy="0"/>
+          <a:chOff x="0" y="0"/>
+          <a:chExt cx="0" cy="0"/>
+        </a:xfrm>
+      </p:grpSpPr>
+      <p:sp>
+        <p:nvSpPr>
+          <p:cNvPr id="2" name="Text Placeholder 1"/>
+          <p:cNvSpPr>
+            <a:spLocks noGrp="1"/>
+          </p:cNvSpPr>
+          <p:nvPr>
+            <p:ph type="body" sz="quarter" idx="13"/>
+          </p:nvPr>
+        </p:nvSpPr>
+        <p:spPr>
+          <a:xfrm>
+            <a:off x="1438507" y="713678"/>
+            <a:ext cx="10114155" cy="6534615"/>
+          </a:xfrm>
+        </p:spPr>
+        <p:txBody>
+          <a:bodyPr>
+            <a:normAutofit/>
+          </a:bodyPr>
+          <a:lstStyle/>
+          <a:p>
+            <a:pPr marL="285750" indent="-285750" algn="l">
+              <a:buFont typeface="Arial" panose="020B0604020202020204" pitchFamily="34" charset="0"/>
+              <a:buChar char="•"/>
+            </a:pPr>
+            <a:endParaRPr lang="en-CA" dirty="0" smtClean="0"/>
+          </a:p>
+          <a:p>
+            <a:pPr marL="285750" indent="-285750" algn="l">
+              <a:buFont typeface="Arial" panose="020B0604020202020204" pitchFamily="34" charset="0"/>
+              <a:buChar char="•"/>
+            </a:pPr>
+            <a:endParaRPr lang="en-CA" dirty="0"/>
+          </a:p>
+          <a:p>
+            <a:pPr marL="285750" indent="-285750" algn="l">
+              <a:buFont typeface="Arial" panose="020B0604020202020204" pitchFamily="34" charset="0"/>
+              <a:buChar char="•"/>
+            </a:pPr>
+            <a:r>
+              <a:rPr lang="en-CA" dirty="0" smtClean="0">
+                <a:latin typeface="Bodoni MT" panose="02070603080606020203" pitchFamily="18" charset="0"/>
+              </a:rPr>
+              <a:t>WE HAVE OBSERVED THAT THERE ARE MORE FATAL AND NON-FATAL ACCIDENTS IN NON-REDLIGHT CAMERAS AREA.</a:t>
+            </a:r>
+          </a:p>
+          <a:p>
+            <a:pPr marL="285750" indent="-285750" algn="l">
+              <a:buFont typeface="Arial" panose="020B0604020202020204" pitchFamily="34" charset="0"/>
+              <a:buChar char="•"/>
+            </a:pPr>
+            <a:r>
+              <a:rPr lang="en-CA" dirty="0" smtClean="0">
+                <a:latin typeface="Bodoni MT" panose="02070603080606020203" pitchFamily="18" charset="0"/>
+              </a:rPr>
+              <a:t>THERE ARE MORE PEDESTRAINS INVOLVED IN COLLISIONS</a:t>
+            </a:r>
+          </a:p>
+          <a:p>
+            <a:pPr marL="285750" indent="-285750" algn="l">
+              <a:buFont typeface="Arial" panose="020B0604020202020204" pitchFamily="34" charset="0"/>
+              <a:buChar char="•"/>
+            </a:pPr>
+            <a:r>
+              <a:rPr lang="en-CA" dirty="0" smtClean="0">
+                <a:latin typeface="Bodoni MT" panose="02070603080606020203" pitchFamily="18" charset="0"/>
+              </a:rPr>
+              <a:t>MORE ACCIDENST HAPPEN IN CLEAR VISIBILITY WHICH MEANS PEOPLE DRIVE CAREFULLY WHEN THERE IS VISIBILITIES ISSUES. </a:t>
+            </a:r>
+          </a:p>
+          <a:p>
+            <a:pPr marL="285750" indent="-285750" algn="l">
+              <a:buFont typeface="Arial" panose="020B0604020202020204" pitchFamily="34" charset="0"/>
+              <a:buChar char="•"/>
+            </a:pPr>
+            <a:r>
+              <a:rPr lang="en-CA" dirty="0" smtClean="0">
+                <a:latin typeface="Bodoni MT" panose="02070603080606020203" pitchFamily="18" charset="0"/>
+              </a:rPr>
+              <a:t>MORE ACCIDENST IN MONTH OF AUGUST AND NOVEMBER AND ON FRIDAYS.</a:t>
+            </a:r>
+          </a:p>
+          <a:p>
+            <a:endParaRPr lang="en-CA" dirty="0">
+              <a:latin typeface="Bodoni MT" panose="02070603080606020203" pitchFamily="18" charset="0"/>
+            </a:endParaRPr>
+          </a:p>
+        </p:txBody>
+      </p:sp>
+      <p:sp>
+        <p:nvSpPr>
+          <p:cNvPr id="4" name="Hexagon 3"/>
+          <p:cNvSpPr/>
+          <p:nvPr/>
+        </p:nvSpPr>
+        <p:spPr>
+          <a:xfrm>
+            <a:off x="1654782" y="334537"/>
+            <a:ext cx="9011249" cy="1717287"/>
+          </a:xfrm>
+          <a:prstGeom prst="hexagon">
+            <a:avLst/>
+          </a:prstGeom>
+          <a:solidFill>
+            <a:schemeClr val="bg2"/>
+          </a:solidFill>
+        </p:spPr>
+        <p:style>
+          <a:lnRef idx="2">
+            <a:schemeClr val="accent1">
+              <a:shade val="50000"/>
+            </a:schemeClr>
+          </a:lnRef>
+          <a:fillRef idx="1">
+            <a:schemeClr val="accent1"/>
+          </a:fillRef>
+          <a:effectRef idx="0">
+            <a:schemeClr val="accent1"/>
+          </a:effectRef>
+          <a:fontRef idx="minor">
+            <a:schemeClr val="lt1"/>
+          </a:fontRef>
+        </p:style>
+        <p:txBody>
+          <a:bodyPr rtlCol="0" anchor="ctr"/>
+          <a:lstStyle/>
+          <a:p>
+            <a:pPr algn="ctr"/>
+            <a:endParaRPr lang="en-CA"/>
+          </a:p>
+        </p:txBody>
+      </p:sp>
+      <p:sp>
+        <p:nvSpPr>
+          <p:cNvPr id="6" name="Title 2"/>
+          <p:cNvSpPr>
+            <a:spLocks noGrp="1"/>
+          </p:cNvSpPr>
+          <p:nvPr>
+            <p:ph type="title"/>
+          </p:nvPr>
+        </p:nvSpPr>
+        <p:spPr>
+          <a:xfrm>
+            <a:off x="445401" y="-479502"/>
+            <a:ext cx="11363740" cy="3267307"/>
+          </a:xfrm>
+        </p:spPr>
+        <p:txBody>
+          <a:bodyPr>
+            <a:noAutofit/>
+          </a:bodyPr>
+          <a:lstStyle/>
+          <a:p>
+            <a:pPr algn="ctr"/>
+            <a:r>
+              <a:rPr lang="en-CA" sz="3600" b="1" dirty="0" smtClean="0">
+                <a:latin typeface="Bodoni MT" panose="02070603080606020203" pitchFamily="18" charset="0"/>
+              </a:rPr>
+              <a:t>VISUALIZATION SUMMARY</a:t>
+            </a:r>
+            <a:br>
+              <a:rPr lang="en-CA" sz="3600" b="1" dirty="0" smtClean="0">
+                <a:latin typeface="Bodoni MT" panose="02070603080606020203" pitchFamily="18" charset="0"/>
+              </a:rPr>
+            </a:br>
+            <a:r>
+              <a:rPr lang="en-CA" sz="3600" b="1" dirty="0" smtClean="0">
+                <a:latin typeface="Bodoni MT" panose="02070603080606020203" pitchFamily="18" charset="0"/>
+              </a:rPr>
+              <a:t>NON-RED LIGHT CAMERAS AREAS</a:t>
+            </a:r>
+            <a:endParaRPr lang="en-CA" sz="3600" b="1" dirty="0">
+              <a:latin typeface="Bodoni MT" panose="02070603080606020203" pitchFamily="18" charset="0"/>
+            </a:endParaRPr>
+          </a:p>
+        </p:txBody>
+      </p:sp>
+    </p:spTree>
+    <p:extLst>
+      <p:ext uri="{BB962C8B-B14F-4D97-AF65-F5344CB8AC3E}">
+        <p14:creationId xmlns:p14="http://schemas.microsoft.com/office/powerpoint/2010/main" val="2622664357"/>
+      </p:ext>
+    </p:extLst>
+  </p:cSld>
+  <p:clrMapOvr>
+    <a:masterClrMapping/>
+  </p:clrMapOvr>
+  <p:timing>
+    <p:tnLst>
+      <p:par>
+        <p:cTn id="1" dur="indefinite" restart="never" nodeType="tmRoot"/>
+      </p:par>
+    </p:tnLst>
+  </p:timing>
+</p:sld>
+</file>
+
+<file path=ppt/slides/slide21.xml><?xml version="1.0" encoding="utf-8"?>
+<p:sld xmlns:a="http://schemas.openxmlformats.org/drawingml/2006/main" xmlns:r="http://schemas.openxmlformats.org/officeDocument/2006/relationships" xmlns:p="http://schemas.openxmlformats.org/presentationml/2006/main">
+  <p:cSld>
+    <p:spTree>
+      <p:nvGrpSpPr>
+        <p:cNvPr id="1" name=""/>
+        <p:cNvGrpSpPr/>
+        <p:nvPr/>
+      </p:nvGrpSpPr>
+      <p:grpSpPr>
+        <a:xfrm>
+          <a:off x="0" y="0"/>
+          <a:ext cx="0" cy="0"/>
+          <a:chOff x="0" y="0"/>
+          <a:chExt cx="0" cy="0"/>
+        </a:xfrm>
+      </p:grpSpPr>
+      <p:sp>
+        <p:nvSpPr>
+          <p:cNvPr id="2" name="Text Placeholder 1"/>
+          <p:cNvSpPr>
+            <a:spLocks noGrp="1"/>
+          </p:cNvSpPr>
+          <p:nvPr>
+            <p:ph type="body" sz="quarter" idx="13"/>
+          </p:nvPr>
+        </p:nvSpPr>
+        <p:spPr>
+          <a:xfrm>
+            <a:off x="1293547" y="2375784"/>
+            <a:ext cx="10203366" cy="4236891"/>
+          </a:xfrm>
+        </p:spPr>
+        <p:txBody>
+          <a:bodyPr>
+            <a:normAutofit/>
+          </a:bodyPr>
+          <a:lstStyle/>
+          <a:p>
+            <a:pPr marL="285750" indent="-285750" algn="l">
+              <a:buFont typeface="Arial" panose="020B0604020202020204" pitchFamily="34" charset="0"/>
+              <a:buChar char="•"/>
+            </a:pPr>
+            <a:r>
+              <a:rPr lang="en-US" sz="2800" dirty="0" smtClean="0">
+                <a:latin typeface="Bodoni MT" panose="02070603080606020203" pitchFamily="18" charset="0"/>
+              </a:rPr>
+              <a:t>Accurately </a:t>
+            </a:r>
+            <a:r>
+              <a:rPr lang="en-US" sz="2800" dirty="0">
+                <a:latin typeface="Bodoni MT" panose="02070603080606020203" pitchFamily="18" charset="0"/>
+              </a:rPr>
+              <a:t>analyzing accidents can help governments </a:t>
+            </a:r>
+            <a:r>
+              <a:rPr lang="en-US" sz="2800" dirty="0" smtClean="0">
+                <a:latin typeface="Bodoni MT" panose="02070603080606020203" pitchFamily="18" charset="0"/>
+              </a:rPr>
+              <a:t>to better </a:t>
+            </a:r>
+            <a:r>
+              <a:rPr lang="en-US" sz="2800" dirty="0">
+                <a:latin typeface="Bodoni MT" panose="02070603080606020203" pitchFamily="18" charset="0"/>
+              </a:rPr>
+              <a:t>the safety of their roads and highways. </a:t>
+            </a:r>
+          </a:p>
+          <a:p>
+            <a:pPr marL="285750" indent="-285750" algn="l">
+              <a:buFont typeface="Arial" panose="020B0604020202020204" pitchFamily="34" charset="0"/>
+              <a:buChar char="•"/>
+            </a:pPr>
+            <a:r>
+              <a:rPr lang="en-US" sz="2800" dirty="0" smtClean="0">
+                <a:latin typeface="Bodoni MT" panose="02070603080606020203" pitchFamily="18" charset="0"/>
+              </a:rPr>
+              <a:t>Identifying </a:t>
+            </a:r>
+            <a:r>
+              <a:rPr lang="en-US" sz="2800" dirty="0">
+                <a:latin typeface="Bodoni MT" panose="02070603080606020203" pitchFamily="18" charset="0"/>
+              </a:rPr>
+              <a:t>high areas of accidents and high areas of accident severity can highlight areas of concern</a:t>
+            </a:r>
+            <a:r>
+              <a:rPr lang="en-US" sz="2800" dirty="0" smtClean="0">
+                <a:latin typeface="Bodoni MT" panose="02070603080606020203" pitchFamily="18" charset="0"/>
+              </a:rPr>
+              <a:t>.</a:t>
+            </a:r>
+          </a:p>
+          <a:p>
+            <a:pPr marL="285750" indent="-285750" algn="l">
+              <a:buFont typeface="Arial" panose="020B0604020202020204" pitchFamily="34" charset="0"/>
+              <a:buChar char="•"/>
+            </a:pPr>
+            <a:r>
+              <a:rPr lang="en-US" sz="2800" dirty="0" smtClean="0">
+                <a:latin typeface="Bodoni MT" panose="02070603080606020203" pitchFamily="18" charset="0"/>
+              </a:rPr>
+              <a:t> </a:t>
+            </a:r>
+            <a:r>
+              <a:rPr lang="en-US" sz="2800" dirty="0">
+                <a:latin typeface="Bodoni MT" panose="02070603080606020203" pitchFamily="18" charset="0"/>
+              </a:rPr>
+              <a:t>It can also be beneficial to insurance companies looking to change their rates in different areas. </a:t>
+            </a:r>
+          </a:p>
+          <a:p>
+            <a:pPr algn="l"/>
+            <a:endParaRPr lang="en-CA" dirty="0"/>
+          </a:p>
+        </p:txBody>
+      </p:sp>
+      <p:sp>
+        <p:nvSpPr>
+          <p:cNvPr id="4" name="Hexagon 3"/>
+          <p:cNvSpPr/>
+          <p:nvPr/>
+        </p:nvSpPr>
+        <p:spPr>
+          <a:xfrm>
+            <a:off x="1766295" y="1081668"/>
+            <a:ext cx="9011249" cy="970156"/>
+          </a:xfrm>
+          <a:prstGeom prst="hexagon">
+            <a:avLst/>
+          </a:prstGeom>
+          <a:solidFill>
+            <a:schemeClr val="bg2"/>
+          </a:solidFill>
+        </p:spPr>
+        <p:style>
+          <a:lnRef idx="2">
+            <a:schemeClr val="accent1">
+              <a:shade val="50000"/>
+            </a:schemeClr>
+          </a:lnRef>
+          <a:fillRef idx="1">
+            <a:schemeClr val="accent1"/>
+          </a:fillRef>
+          <a:effectRef idx="0">
+            <a:schemeClr val="accent1"/>
+          </a:effectRef>
+          <a:fontRef idx="minor">
+            <a:schemeClr val="lt1"/>
+          </a:fontRef>
+        </p:style>
+        <p:txBody>
+          <a:bodyPr rtlCol="0" anchor="ctr"/>
+          <a:lstStyle/>
+          <a:p>
+            <a:pPr algn="ctr"/>
+            <a:endParaRPr lang="en-CA"/>
+          </a:p>
+        </p:txBody>
+      </p:sp>
+      <p:sp>
+        <p:nvSpPr>
+          <p:cNvPr id="6" name="Title 2"/>
+          <p:cNvSpPr>
+            <a:spLocks noGrp="1"/>
+          </p:cNvSpPr>
+          <p:nvPr>
+            <p:ph type="title"/>
+          </p:nvPr>
+        </p:nvSpPr>
+        <p:spPr>
+          <a:xfrm>
+            <a:off x="857993" y="1163140"/>
+            <a:ext cx="10515600" cy="807211"/>
+          </a:xfrm>
+        </p:spPr>
+        <p:txBody>
+          <a:bodyPr>
+            <a:normAutofit/>
+          </a:bodyPr>
+          <a:lstStyle/>
+          <a:p>
+            <a:pPr algn="ctr"/>
+            <a:r>
+              <a:rPr lang="en-CA" sz="3600" b="1" dirty="0" smtClean="0">
+                <a:latin typeface="Bodoni MT" panose="02070603080606020203" pitchFamily="18" charset="0"/>
+              </a:rPr>
+              <a:t>IMPORTANCE OFTHIS ANALYSIS</a:t>
+            </a:r>
+            <a:endParaRPr lang="en-CA" sz="3600" b="1" dirty="0">
+              <a:latin typeface="Bodoni MT" panose="02070603080606020203" pitchFamily="18" charset="0"/>
+            </a:endParaRPr>
+          </a:p>
+        </p:txBody>
+      </p:sp>
+    </p:spTree>
+    <p:extLst>
+      <p:ext uri="{BB962C8B-B14F-4D97-AF65-F5344CB8AC3E}">
+        <p14:creationId xmlns:p14="http://schemas.microsoft.com/office/powerpoint/2010/main" val="4069956856"/>
+      </p:ext>
+    </p:extLst>
+  </p:cSld>
+  <p:clrMapOvr>
+    <a:masterClrMapping/>
+  </p:clrMapOvr>
+  <p:timing>
+    <p:tnLst>
+      <p:par>
+        <p:cTn id="1" dur="indefinite" restart="never" nodeType="tmRoot"/>
+      </p:par>
+    </p:tnLst>
+  </p:timing>
+</p:sld>
+</file>
+
 <file path=ppt/slides/slide3.xml><?xml version="1.0" encoding="utf-8"?>
 <p:sld xmlns:a="http://schemas.openxmlformats.org/drawingml/2006/main" xmlns:r="http://schemas.openxmlformats.org/officeDocument/2006/relationships" xmlns:p="http://schemas.openxmlformats.org/presentationml/2006/main">
   <p:cSld>
@@ -12512,7 +13864,7 @@
           <p:cNvPr id="3" name="Text Placeholder 2">
             <a:extLst>
               <a:ext uri="{FF2B5EF4-FFF2-40B4-BE49-F238E27FC236}">
-                <a16:creationId xmlns:a16="http://schemas.microsoft.com/office/drawing/2014/main" xmlns="" id="{0A5DE91B-16BB-4A74-8A74-C75F40552622}"/>
+                <a16:creationId xmlns="" xmlns:a16="http://schemas.microsoft.com/office/drawing/2014/main" id="{0A5DE91B-16BB-4A74-8A74-C75F40552622}"/>
               </a:ext>
             </a:extLst>
           </p:cNvPr>
@@ -12533,7 +13885,7 @@
                 <a:hlinkClick r:id="rId2">
                   <a:extLst>
                     <a:ext uri="{A12FA001-AC4F-418D-AE19-62706E023703}">
-                      <ahyp:hlinkClr xmlns:ahyp="http://schemas.microsoft.com/office/drawing/2018/hyperlinkcolor" xmlns="" val="tx"/>
+                      <ahyp:hlinkClr xmlns="" xmlns:ahyp="http://schemas.microsoft.com/office/drawing/2018/hyperlinkcolor" val="tx"/>
                     </a:ext>
                   </a:extLst>
                 </a:hlinkClick>
@@ -12547,7 +13899,7 @@
                 <a:hlinkClick r:id="rId2">
                   <a:extLst>
                     <a:ext uri="{A12FA001-AC4F-418D-AE19-62706E023703}">
-                      <ahyp:hlinkClr xmlns:ahyp="http://schemas.microsoft.com/office/drawing/2018/hyperlinkcolor" xmlns="" val="tx"/>
+                      <ahyp:hlinkClr xmlns="" xmlns:ahyp="http://schemas.microsoft.com/office/drawing/2018/hyperlinkcolor" val="tx"/>
                     </a:ext>
                   </a:extLst>
                 </a:hlinkClick>
@@ -12636,7 +13988,7 @@
           <p:cNvPr id="13" name="Title 7">
             <a:extLst>
               <a:ext uri="{FF2B5EF4-FFF2-40B4-BE49-F238E27FC236}">
-                <a16:creationId xmlns:a16="http://schemas.microsoft.com/office/drawing/2014/main" xmlns="" id="{75ADCE49-1577-4FC1-84B1-42EA3100BD60}"/>
+                <a16:creationId xmlns="" xmlns:a16="http://schemas.microsoft.com/office/drawing/2014/main" id="{75ADCE49-1577-4FC1-84B1-42EA3100BD60}"/>
               </a:ext>
             </a:extLst>
           </p:cNvPr>
@@ -14683,15 +16035,6 @@
 </file>
 
 <file path=customXml/item2.xml><?xml version="1.0" encoding="utf-8"?>
-<?mso-contentType ?>
-<FormTemplates xmlns="http://schemas.microsoft.com/sharepoint/v3/contenttype/forms">
-  <Display>DocumentLibraryForm</Display>
-  <Edit>DocumentLibraryForm</Edit>
-  <New>DocumentLibraryForm</New>
-</FormTemplates>
-</file>
-
-<file path=customXml/item3.xml><?xml version="1.0" encoding="utf-8"?>
 <ct:contentTypeSchema xmlns:ct="http://schemas.microsoft.com/office/2006/metadata/contentType" xmlns:ma="http://schemas.microsoft.com/office/2006/metadata/properties/metaAttributes" ct:_="" ma:_="" ma:contentTypeName="Document" ma:contentTypeID="0x01010079F111ED35F8CC479449609E8A0923A6" ma:contentTypeVersion="11" ma:contentTypeDescription="Create a new document." ma:contentTypeScope="" ma:versionID="96291512c1ee715ab617f4c07df79fc1">
   <xsd:schema xmlns:xsd="http://www.w3.org/2001/XMLSchema" xmlns:xs="http://www.w3.org/2001/XMLSchema" xmlns:p="http://schemas.microsoft.com/office/2006/metadata/properties" xmlns:ns2="71af3243-3dd4-4a8d-8c0d-dd76da1f02a5" xmlns:ns3="16c05727-aa75-4e4a-9b5f-8a80a1165891" targetNamespace="http://schemas.microsoft.com/office/2006/metadata/properties" ma:root="true" ma:fieldsID="8256c27c40ca5c40ce1cf6c44f0205df" ns2:_="" ns3:_="">
     <xsd:import namespace="71af3243-3dd4-4a8d-8c0d-dd76da1f02a5"/>
@@ -14902,32 +16245,33 @@
 </ct:contentTypeSchema>
 </file>
 
+<file path=customXml/item3.xml><?xml version="1.0" encoding="utf-8"?>
+<?mso-contentType ?>
+<FormTemplates xmlns="http://schemas.microsoft.com/sharepoint/v3/contenttype/forms">
+  <Display>DocumentLibraryForm</Display>
+  <Edit>DocumentLibraryForm</Edit>
+  <New>DocumentLibraryForm</New>
+</FormTemplates>
+</file>
+
 <file path=customXml/itemProps1.xml><?xml version="1.0" encoding="utf-8"?>
 <ds:datastoreItem xmlns:ds="http://schemas.openxmlformats.org/officeDocument/2006/customXml" ds:itemID="{07ECE1D0-6BAB-4E58-8A9D-B6BE29B134CE}">
   <ds:schemaRefs>
-    <ds:schemaRef ds:uri="http://schemas.microsoft.com/office/infopath/2007/PartnerControls"/>
     <ds:schemaRef ds:uri="http://purl.org/dc/terms/"/>
     <ds:schemaRef ds:uri="http://schemas.microsoft.com/office/2006/documentManagement/types"/>
-    <ds:schemaRef ds:uri="http://purl.org/dc/elements/1.1/"/>
     <ds:schemaRef ds:uri="http://schemas.openxmlformats.org/package/2006/metadata/core-properties"/>
     <ds:schemaRef ds:uri="16c05727-aa75-4e4a-9b5f-8a80a1165891"/>
+    <ds:schemaRef ds:uri="http://purl.org/dc/elements/1.1/"/>
+    <ds:schemaRef ds:uri="http://schemas.microsoft.com/office/infopath/2007/PartnerControls"/>
+    <ds:schemaRef ds:uri="http://purl.org/dc/dcmitype/"/>
+    <ds:schemaRef ds:uri="http://www.w3.org/XML/1998/namespace"/>
     <ds:schemaRef ds:uri="71af3243-3dd4-4a8d-8c0d-dd76da1f02a5"/>
     <ds:schemaRef ds:uri="http://schemas.microsoft.com/office/2006/metadata/properties"/>
-    <ds:schemaRef ds:uri="http://www.w3.org/XML/1998/namespace"/>
-    <ds:schemaRef ds:uri="http://purl.org/dc/dcmitype/"/>
   </ds:schemaRefs>
 </ds:datastoreItem>
 </file>
 
 <file path=customXml/itemProps2.xml><?xml version="1.0" encoding="utf-8"?>
-<ds:datastoreItem xmlns:ds="http://schemas.openxmlformats.org/officeDocument/2006/customXml" ds:itemID="{4E5DF72C-84FE-445A-986B-67AE46C50DAE}">
-  <ds:schemaRefs>
-    <ds:schemaRef ds:uri="http://schemas.microsoft.com/sharepoint/v3/contenttype/forms"/>
-  </ds:schemaRefs>
-</ds:datastoreItem>
-</file>
-
-<file path=customXml/itemProps3.xml><?xml version="1.0" encoding="utf-8"?>
 <ds:datastoreItem xmlns:ds="http://schemas.openxmlformats.org/officeDocument/2006/customXml" ds:itemID="{EFDD14FE-EA04-4AC1-9948-7ECDFBDB7469}">
   <ds:schemaRefs>
     <ds:schemaRef ds:uri="http://schemas.microsoft.com/office/2006/metadata/contentType"/>
@@ -14944,4 +16288,12 @@
     <ds:schemaRef ds:uri="http://schemas.microsoft.com/internal/obd"/>
   </ds:schemaRefs>
 </ds:datastoreItem>
+</file>
+
+<file path=customXml/itemProps3.xml><?xml version="1.0" encoding="utf-8"?>
+<ds:datastoreItem xmlns:ds="http://schemas.openxmlformats.org/officeDocument/2006/customXml" ds:itemID="{4E5DF72C-84FE-445A-986B-67AE46C50DAE}">
+  <ds:schemaRefs>
+    <ds:schemaRef ds:uri="http://schemas.microsoft.com/sharepoint/v3/contenttype/forms"/>
+  </ds:schemaRefs>
+</ds:datastoreItem>
 </file>
</xml_diff>